<commit_message>
updates with trello and github screenshots
Updating presentation with some trello github screenshots
</commit_message>
<xml_diff>
--- a/documentation/Demonstrations/Connacht_University_TeamDC.pptx
+++ b/documentation/Demonstrations/Connacht_University_TeamDC.pptx
@@ -5,23 +5,25 @@
     <p:sldMasterId id="2147483648" r:id="rId4"/>
   </p:sldMasterIdLst>
   <p:notesMasterIdLst>
-    <p:notesMasterId r:id="rId16"/>
+    <p:notesMasterId r:id="rId18"/>
   </p:notesMasterIdLst>
   <p:handoutMasterIdLst>
-    <p:handoutMasterId r:id="rId17"/>
+    <p:handoutMasterId r:id="rId19"/>
   </p:handoutMasterIdLst>
   <p:sldIdLst>
     <p:sldId id="256" r:id="rId5"/>
     <p:sldId id="266" r:id="rId6"/>
-    <p:sldId id="270" r:id="rId7"/>
-    <p:sldId id="267" r:id="rId8"/>
-    <p:sldId id="271" r:id="rId9"/>
-    <p:sldId id="272" r:id="rId10"/>
-    <p:sldId id="273" r:id="rId11"/>
-    <p:sldId id="274" r:id="rId12"/>
-    <p:sldId id="276" r:id="rId13"/>
-    <p:sldId id="275" r:id="rId14"/>
-    <p:sldId id="264" r:id="rId15"/>
+    <p:sldId id="278" r:id="rId7"/>
+    <p:sldId id="277" r:id="rId8"/>
+    <p:sldId id="270" r:id="rId9"/>
+    <p:sldId id="267" r:id="rId10"/>
+    <p:sldId id="271" r:id="rId11"/>
+    <p:sldId id="272" r:id="rId12"/>
+    <p:sldId id="273" r:id="rId13"/>
+    <p:sldId id="274" r:id="rId14"/>
+    <p:sldId id="276" r:id="rId15"/>
+    <p:sldId id="275" r:id="rId16"/>
+    <p:sldId id="264" r:id="rId17"/>
   </p:sldIdLst>
   <p:sldSz cx="12192000" cy="6858000"/>
   <p:notesSz cx="6858000" cy="9144000"/>
@@ -225,7 +227,7 @@
           <a:p>
             <a:fld id="{73B2889B-A0AC-4482-8592-5C96F2309420}" type="datetimeFigureOut">
               <a:rPr lang="en-US" smtClean="0"/>
-              <a:t>6/17/2020</a:t>
+              <a:t>6/18/2020</a:t>
             </a:fld>
             <a:endParaRPr lang="en-US" dirty="0"/>
           </a:p>
@@ -402,7 +404,7 @@
           <a:p>
             <a:fld id="{830EB223-FFC0-462A-A3B8-EAA7CE0F8CBD}" type="datetimeFigureOut">
               <a:rPr lang="en-US" smtClean="0"/>
-              <a:t>6/17/2020</a:t>
+              <a:t>6/18/2020</a:t>
             </a:fld>
             <a:endParaRPr lang="en-US" dirty="0"/>
           </a:p>
@@ -1060,7 +1062,7 @@
           <a:p>
             <a:fld id="{BC849E9A-41F7-4779-A581-48A7C374A227}" type="slidenum">
               <a:rPr lang="en-US" smtClean="0"/>
-              <a:t>3</a:t>
+              <a:t>5</a:t>
             </a:fld>
             <a:endParaRPr lang="en-US" dirty="0"/>
           </a:p>
@@ -1199,7 +1201,7 @@
           <a:p>
             <a:fld id="{BC849E9A-41F7-4779-A581-48A7C374A227}" type="slidenum">
               <a:rPr lang="en-US" smtClean="0"/>
-              <a:t>4</a:t>
+              <a:t>6</a:t>
             </a:fld>
             <a:endParaRPr lang="en-US" dirty="0"/>
           </a:p>
@@ -1454,7 +1456,7 @@
           <a:p>
             <a:fld id="{BC849E9A-41F7-4779-A581-48A7C374A227}" type="slidenum">
               <a:rPr lang="en-US" smtClean="0"/>
-              <a:t>5</a:t>
+              <a:t>7</a:t>
             </a:fld>
             <a:endParaRPr lang="en-US" dirty="0"/>
           </a:p>
@@ -1709,7 +1711,7 @@
           <a:p>
             <a:fld id="{BC849E9A-41F7-4779-A581-48A7C374A227}" type="slidenum">
               <a:rPr lang="en-US" smtClean="0"/>
-              <a:t>6</a:t>
+              <a:t>8</a:t>
             </a:fld>
             <a:endParaRPr lang="en-US" dirty="0"/>
           </a:p>
@@ -1964,7 +1966,7 @@
           <a:p>
             <a:fld id="{BC849E9A-41F7-4779-A581-48A7C374A227}" type="slidenum">
               <a:rPr lang="en-US" smtClean="0"/>
-              <a:t>7</a:t>
+              <a:t>9</a:t>
             </a:fld>
             <a:endParaRPr lang="en-US" dirty="0"/>
           </a:p>
@@ -2219,7 +2221,7 @@
           <a:p>
             <a:fld id="{BC849E9A-41F7-4779-A581-48A7C374A227}" type="slidenum">
               <a:rPr lang="en-US" smtClean="0"/>
-              <a:t>8</a:t>
+              <a:t>10</a:t>
             </a:fld>
             <a:endParaRPr lang="en-US" dirty="0"/>
           </a:p>
@@ -2474,7 +2476,7 @@
           <a:p>
             <a:fld id="{BC849E9A-41F7-4779-A581-48A7C374A227}" type="slidenum">
               <a:rPr lang="en-US" smtClean="0"/>
-              <a:t>10</a:t>
+              <a:t>12</a:t>
             </a:fld>
             <a:endParaRPr lang="en-US" dirty="0"/>
           </a:p>
@@ -2648,7 +2650,7 @@
           <a:p>
             <a:fld id="{BC849E9A-41F7-4779-A581-48A7C374A227}" type="slidenum">
               <a:rPr lang="en-US" smtClean="0"/>
-              <a:t>11</a:t>
+              <a:t>13</a:t>
             </a:fld>
             <a:endParaRPr lang="en-US" dirty="0"/>
           </a:p>
@@ -2814,7 +2816,7 @@
           <a:p>
             <a:fld id="{DECF21A4-E71B-4D3A-AF45-E989C23A7BB1}" type="datetimeFigureOut">
               <a:rPr lang="en-US" smtClean="0"/>
-              <a:t>6/17/2020</a:t>
+              <a:t>6/18/2020</a:t>
             </a:fld>
             <a:endParaRPr lang="en-US" dirty="0"/>
           </a:p>
@@ -3012,7 +3014,7 @@
           <a:p>
             <a:fld id="{DECF21A4-E71B-4D3A-AF45-E989C23A7BB1}" type="datetimeFigureOut">
               <a:rPr lang="en-US" smtClean="0"/>
-              <a:t>6/17/2020</a:t>
+              <a:t>6/18/2020</a:t>
             </a:fld>
             <a:endParaRPr lang="en-US" dirty="0"/>
           </a:p>
@@ -3220,7 +3222,7 @@
           <a:p>
             <a:fld id="{DECF21A4-E71B-4D3A-AF45-E989C23A7BB1}" type="datetimeFigureOut">
               <a:rPr lang="en-US" smtClean="0"/>
-              <a:t>6/17/2020</a:t>
+              <a:t>6/18/2020</a:t>
             </a:fld>
             <a:endParaRPr lang="en-US" dirty="0"/>
           </a:p>
@@ -3418,7 +3420,7 @@
           <a:p>
             <a:fld id="{DECF21A4-E71B-4D3A-AF45-E989C23A7BB1}" type="datetimeFigureOut">
               <a:rPr lang="en-US" smtClean="0"/>
-              <a:t>6/17/2020</a:t>
+              <a:t>6/18/2020</a:t>
             </a:fld>
             <a:endParaRPr lang="en-US" dirty="0"/>
           </a:p>
@@ -3693,7 +3695,7 @@
           <a:p>
             <a:fld id="{DECF21A4-E71B-4D3A-AF45-E989C23A7BB1}" type="datetimeFigureOut">
               <a:rPr lang="en-US" smtClean="0"/>
-              <a:t>6/17/2020</a:t>
+              <a:t>6/18/2020</a:t>
             </a:fld>
             <a:endParaRPr lang="en-US" dirty="0"/>
           </a:p>
@@ -3958,7 +3960,7 @@
           <a:p>
             <a:fld id="{DECF21A4-E71B-4D3A-AF45-E989C23A7BB1}" type="datetimeFigureOut">
               <a:rPr lang="en-US" smtClean="0"/>
-              <a:t>6/17/2020</a:t>
+              <a:t>6/18/2020</a:t>
             </a:fld>
             <a:endParaRPr lang="en-US" dirty="0"/>
           </a:p>
@@ -4370,7 +4372,7 @@
           <a:p>
             <a:fld id="{DECF21A4-E71B-4D3A-AF45-E989C23A7BB1}" type="datetimeFigureOut">
               <a:rPr lang="en-US" smtClean="0"/>
-              <a:t>6/17/2020</a:t>
+              <a:t>6/18/2020</a:t>
             </a:fld>
             <a:endParaRPr lang="en-US" dirty="0"/>
           </a:p>
@@ -4511,7 +4513,7 @@
           <a:p>
             <a:fld id="{DECF21A4-E71B-4D3A-AF45-E989C23A7BB1}" type="datetimeFigureOut">
               <a:rPr lang="en-US" smtClean="0"/>
-              <a:t>6/17/2020</a:t>
+              <a:t>6/18/2020</a:t>
             </a:fld>
             <a:endParaRPr lang="en-US" dirty="0"/>
           </a:p>
@@ -4624,7 +4626,7 @@
           <a:p>
             <a:fld id="{DECF21A4-E71B-4D3A-AF45-E989C23A7BB1}" type="datetimeFigureOut">
               <a:rPr lang="en-US" smtClean="0"/>
-              <a:t>6/17/2020</a:t>
+              <a:t>6/18/2020</a:t>
             </a:fld>
             <a:endParaRPr lang="en-US" dirty="0"/>
           </a:p>
@@ -4935,7 +4937,7 @@
           <a:p>
             <a:fld id="{DECF21A4-E71B-4D3A-AF45-E989C23A7BB1}" type="datetimeFigureOut">
               <a:rPr lang="en-US" smtClean="0"/>
-              <a:t>6/17/2020</a:t>
+              <a:t>6/18/2020</a:t>
             </a:fld>
             <a:endParaRPr lang="en-US" dirty="0"/>
           </a:p>
@@ -5226,7 +5228,7 @@
           <a:p>
             <a:fld id="{DECF21A4-E71B-4D3A-AF45-E989C23A7BB1}" type="datetimeFigureOut">
               <a:rPr lang="en-US" smtClean="0"/>
-              <a:t>6/17/2020</a:t>
+              <a:t>6/18/2020</a:t>
             </a:fld>
             <a:endParaRPr lang="en-US" dirty="0"/>
           </a:p>
@@ -5467,7 +5469,7 @@
           <a:p>
             <a:fld id="{DECF21A4-E71B-4D3A-AF45-E989C23A7BB1}" type="datetimeFigureOut">
               <a:rPr lang="en-US" smtClean="0"/>
-              <a:t>6/17/2020</a:t>
+              <a:t>6/18/2020</a:t>
             </a:fld>
             <a:endParaRPr lang="en-US" dirty="0"/>
           </a:p>
@@ -7196,16 +7198,21 @@
           <a:p>
             <a:pPr algn="ctr"/>
             <a:r>
-              <a:rPr lang="en-US" sz="4000" kern="1200" dirty="0">
-                <a:solidFill>
-                  <a:schemeClr val="tx1"/>
-                </a:solidFill>
-                <a:latin typeface="+mj-lt"/>
-                <a:ea typeface="+mj-ea"/>
-                <a:cs typeface="+mj-cs"/>
-              </a:rPr>
-              <a:t>Mock-ups</a:t>
-            </a:r>
+              <a:rPr lang="en-US" sz="4000" dirty="0"/>
+              <a:t>AWS </a:t>
+            </a:r>
+            <a:r>
+              <a:rPr lang="en-US" sz="4000" dirty="0" err="1"/>
+              <a:t>CodeBuild</a:t>
+            </a:r>
+            <a:endParaRPr lang="en-US" sz="4000" kern="1200" dirty="0">
+              <a:solidFill>
+                <a:schemeClr val="tx1"/>
+              </a:solidFill>
+              <a:latin typeface="+mj-lt"/>
+              <a:ea typeface="+mj-ea"/>
+              <a:cs typeface="+mj-cs"/>
+            </a:endParaRPr>
           </a:p>
         </p:txBody>
       </p:sp>
@@ -7279,6 +7286,659 @@
           </a:p>
         </p:txBody>
       </p:sp>
+      <p:sp>
+        <p:nvSpPr>
+          <p:cNvPr id="3" name="TextBox 2">
+            <a:extLst>
+              <a:ext uri="{FF2B5EF4-FFF2-40B4-BE49-F238E27FC236}">
+                <a16:creationId xmlns:a16="http://schemas.microsoft.com/office/drawing/2014/main" id="{3DA47A83-3C4B-4A44-A497-1DB8B4E3B592}"/>
+              </a:ext>
+            </a:extLst>
+          </p:cNvPr>
+          <p:cNvSpPr txBox="1"/>
+          <p:nvPr/>
+        </p:nvSpPr>
+        <p:spPr>
+          <a:xfrm>
+            <a:off x="1090670" y="2375471"/>
+            <a:ext cx="10113484" cy="4204356"/>
+          </a:xfrm>
+          <a:prstGeom prst="rect">
+            <a:avLst/>
+          </a:prstGeom>
+          <a:noFill/>
+        </p:spPr>
+        <p:txBody>
+          <a:bodyPr wrap="square" rtlCol="0">
+            <a:spAutoFit/>
+          </a:bodyPr>
+          <a:lstStyle/>
+          <a:p>
+            <a:pPr marL="285750" indent="-285750">
+              <a:lnSpc>
+                <a:spcPct val="150000"/>
+              </a:lnSpc>
+              <a:buFont typeface="Arial" panose="020B0604020202020204" pitchFamily="34" charset="0"/>
+              <a:buChar char="•"/>
+            </a:pPr>
+            <a:r>
+              <a:rPr lang="en-US" dirty="0"/>
+              <a:t>Build service, which compiles source code, runs tests, and produces artifacts</a:t>
+            </a:r>
+          </a:p>
+          <a:p>
+            <a:pPr marL="285750" indent="-285750">
+              <a:lnSpc>
+                <a:spcPct val="150000"/>
+              </a:lnSpc>
+              <a:buFont typeface="Arial" panose="020B0604020202020204" pitchFamily="34" charset="0"/>
+              <a:buChar char="•"/>
+            </a:pPr>
+            <a:r>
+              <a:rPr lang="en-US" dirty="0"/>
+              <a:t>Pulls source code from </a:t>
+            </a:r>
+            <a:r>
+              <a:rPr lang="en-US" dirty="0" err="1"/>
+              <a:t>CodeCommit</a:t>
+            </a:r>
+            <a:r>
+              <a:rPr lang="en-US" dirty="0"/>
+              <a:t>, Amazon S3, GitHub, or Bitbucket</a:t>
+            </a:r>
+          </a:p>
+          <a:p>
+            <a:pPr marL="285750" indent="-285750">
+              <a:lnSpc>
+                <a:spcPct val="150000"/>
+              </a:lnSpc>
+              <a:buFont typeface="Arial" panose="020B0604020202020204" pitchFamily="34" charset="0"/>
+              <a:buChar char="•"/>
+            </a:pPr>
+            <a:r>
+              <a:rPr lang="en-US" dirty="0"/>
+              <a:t>Supports popular programming languages and build tools, and can be customized</a:t>
+            </a:r>
+          </a:p>
+          <a:p>
+            <a:pPr marL="285750" indent="-285750">
+              <a:lnSpc>
+                <a:spcPct val="150000"/>
+              </a:lnSpc>
+              <a:buFont typeface="Arial" panose="020B0604020202020204" pitchFamily="34" charset="0"/>
+              <a:buChar char="•"/>
+            </a:pPr>
+            <a:r>
+              <a:rPr lang="en-US" dirty="0"/>
+              <a:t>Run via AWS </a:t>
+            </a:r>
+            <a:r>
+              <a:rPr lang="en-US" dirty="0" err="1"/>
+              <a:t>CodeBuild</a:t>
+            </a:r>
+            <a:r>
+              <a:rPr lang="en-US" dirty="0"/>
+              <a:t> console, AWS CLI, AWS SDKs, or AWS </a:t>
+            </a:r>
+            <a:r>
+              <a:rPr lang="en-US" dirty="0" err="1"/>
+              <a:t>CodePipeline</a:t>
+            </a:r>
+            <a:endParaRPr lang="en-US" dirty="0"/>
+          </a:p>
+          <a:p>
+            <a:pPr marL="285750" indent="-285750">
+              <a:lnSpc>
+                <a:spcPct val="150000"/>
+              </a:lnSpc>
+              <a:buFont typeface="Arial" panose="020B0604020202020204" pitchFamily="34" charset="0"/>
+              <a:buChar char="•"/>
+            </a:pPr>
+            <a:r>
+              <a:rPr lang="en-US" dirty="0"/>
+              <a:t>Ability to view the overall status of the build, build phase details, and build logs</a:t>
+            </a:r>
+          </a:p>
+          <a:p>
+            <a:pPr marL="285750" indent="-285750">
+              <a:lnSpc>
+                <a:spcPct val="150000"/>
+              </a:lnSpc>
+              <a:buFont typeface="Arial" panose="020B0604020202020204" pitchFamily="34" charset="0"/>
+              <a:buChar char="•"/>
+            </a:pPr>
+            <a:r>
+              <a:rPr lang="en-US" dirty="0"/>
+              <a:t>Build specifications are written using a specific </a:t>
+            </a:r>
+            <a:r>
+              <a:rPr lang="en-US" dirty="0">
+                <a:hlinkClick r:id="rId3"/>
+              </a:rPr>
+              <a:t>syntax</a:t>
+            </a:r>
+            <a:r>
+              <a:rPr lang="en-US" dirty="0"/>
+              <a:t>, in a </a:t>
+            </a:r>
+            <a:r>
+              <a:rPr lang="en-US" dirty="0" err="1"/>
+              <a:t>yaml</a:t>
+            </a:r>
+            <a:r>
+              <a:rPr lang="en-US" dirty="0"/>
+              <a:t> format</a:t>
+            </a:r>
+          </a:p>
+          <a:p>
+            <a:pPr marL="285750" indent="-285750">
+              <a:lnSpc>
+                <a:spcPct val="150000"/>
+              </a:lnSpc>
+              <a:buFont typeface="Arial" panose="020B0604020202020204" pitchFamily="34" charset="0"/>
+              <a:buChar char="•"/>
+            </a:pPr>
+            <a:r>
+              <a:rPr lang="en-US" dirty="0">
+                <a:hlinkClick r:id="rId4"/>
+              </a:rPr>
+              <a:t>Pricing</a:t>
+            </a:r>
+            <a:r>
+              <a:rPr lang="en-US" dirty="0"/>
+              <a:t> is based on the number of build minutes, and there is a free tier option</a:t>
+            </a:r>
+          </a:p>
+          <a:p>
+            <a:pPr marL="285750" indent="-285750">
+              <a:lnSpc>
+                <a:spcPct val="150000"/>
+              </a:lnSpc>
+              <a:buFont typeface="Arial" panose="020B0604020202020204" pitchFamily="34" charset="0"/>
+              <a:buChar char="•"/>
+            </a:pPr>
+            <a:r>
+              <a:rPr lang="en-US" dirty="0"/>
+              <a:t>Team decided to use AWS </a:t>
+            </a:r>
+            <a:r>
+              <a:rPr lang="en-US" dirty="0" err="1"/>
+              <a:t>CodeBuild</a:t>
+            </a:r>
+            <a:r>
+              <a:rPr lang="en-US" dirty="0"/>
+              <a:t> because of the easy integration with AWS </a:t>
+            </a:r>
+            <a:r>
+              <a:rPr lang="en-US" dirty="0" err="1"/>
+              <a:t>CodePipeline</a:t>
+            </a:r>
+            <a:endParaRPr lang="en-US" dirty="0"/>
+          </a:p>
+          <a:p>
+            <a:pPr marL="285750" indent="-285750">
+              <a:lnSpc>
+                <a:spcPct val="150000"/>
+              </a:lnSpc>
+              <a:buFont typeface="Arial" panose="020B0604020202020204" pitchFamily="34" charset="0"/>
+              <a:buChar char="•"/>
+            </a:pPr>
+            <a:endParaRPr lang="en-US" dirty="0"/>
+          </a:p>
+          <a:p>
+            <a:pPr lvl="1">
+              <a:lnSpc>
+                <a:spcPct val="150000"/>
+              </a:lnSpc>
+            </a:pPr>
+            <a:r>
+              <a:rPr lang="en-US" dirty="0"/>
+              <a:t>(Source:  </a:t>
+            </a:r>
+            <a:r>
+              <a:rPr lang="fr-FR" dirty="0">
+                <a:hlinkClick r:id="rId5"/>
+              </a:rPr>
+              <a:t>https://docs.aws.amazon.com/codebuild/latest/userguide/welcome.html</a:t>
+            </a:r>
+            <a:r>
+              <a:rPr lang="fr-FR" dirty="0"/>
+              <a:t>)</a:t>
+            </a:r>
+            <a:endParaRPr lang="en-US" dirty="0"/>
+          </a:p>
+        </p:txBody>
+      </p:sp>
+    </p:spTree>
+    <p:extLst>
+      <p:ext uri="{BB962C8B-B14F-4D97-AF65-F5344CB8AC3E}">
+        <p14:creationId xmlns:p14="http://schemas.microsoft.com/office/powerpoint/2010/main" val="512997375"/>
+      </p:ext>
+    </p:extLst>
+  </p:cSld>
+  <p:clrMapOvr>
+    <a:masterClrMapping/>
+  </p:clrMapOvr>
+</p:sld>
+</file>
+
+<file path=ppt/slides/slide11.xml><?xml version="1.0" encoding="utf-8"?>
+<p:sld xmlns:a="http://schemas.openxmlformats.org/drawingml/2006/main" xmlns:r="http://schemas.openxmlformats.org/officeDocument/2006/relationships" xmlns:p="http://schemas.openxmlformats.org/presentationml/2006/main">
+  <p:cSld>
+    <p:spTree>
+      <p:nvGrpSpPr>
+        <p:cNvPr id="1" name=""/>
+        <p:cNvGrpSpPr/>
+        <p:nvPr/>
+      </p:nvGrpSpPr>
+      <p:grpSpPr>
+        <a:xfrm>
+          <a:off x="0" y="0"/>
+          <a:ext cx="0" cy="0"/>
+          <a:chOff x="0" y="0"/>
+          <a:chExt cx="0" cy="0"/>
+        </a:xfrm>
+      </p:grpSpPr>
+      <p:pic>
+        <p:nvPicPr>
+          <p:cNvPr id="4" name="Picture 3">
+            <a:extLst>
+              <a:ext uri="{FF2B5EF4-FFF2-40B4-BE49-F238E27FC236}">
+                <a16:creationId xmlns:a16="http://schemas.microsoft.com/office/drawing/2014/main" id="{05D957DA-20B5-425F-8107-70B33683D008}"/>
+              </a:ext>
+            </a:extLst>
+          </p:cNvPr>
+          <p:cNvPicPr>
+            <a:picLocks noChangeAspect="1"/>
+          </p:cNvPicPr>
+          <p:nvPr/>
+        </p:nvPicPr>
+        <p:blipFill>
+          <a:blip r:embed="rId2"/>
+          <a:stretch>
+            <a:fillRect/>
+          </a:stretch>
+        </p:blipFill>
+        <p:spPr>
+          <a:xfrm>
+            <a:off x="5549735" y="283944"/>
+            <a:ext cx="4381005" cy="3052506"/>
+          </a:xfrm>
+          <a:prstGeom prst="rect">
+            <a:avLst/>
+          </a:prstGeom>
+        </p:spPr>
+      </p:pic>
+      <p:pic>
+        <p:nvPicPr>
+          <p:cNvPr id="5" name="Picture 4">
+            <a:extLst>
+              <a:ext uri="{FF2B5EF4-FFF2-40B4-BE49-F238E27FC236}">
+                <a16:creationId xmlns:a16="http://schemas.microsoft.com/office/drawing/2014/main" id="{C163E8EA-8E86-4750-AAD1-89302E978901}"/>
+              </a:ext>
+            </a:extLst>
+          </p:cNvPr>
+          <p:cNvPicPr>
+            <a:picLocks noChangeAspect="1"/>
+          </p:cNvPicPr>
+          <p:nvPr/>
+        </p:nvPicPr>
+        <p:blipFill>
+          <a:blip r:embed="rId3"/>
+          <a:stretch>
+            <a:fillRect/>
+          </a:stretch>
+        </p:blipFill>
+        <p:spPr>
+          <a:xfrm>
+            <a:off x="2388919" y="3521551"/>
+            <a:ext cx="6915398" cy="2949481"/>
+          </a:xfrm>
+          <a:prstGeom prst="rect">
+            <a:avLst/>
+          </a:prstGeom>
+        </p:spPr>
+      </p:pic>
+      <p:pic>
+        <p:nvPicPr>
+          <p:cNvPr id="6" name="Picture 5">
+            <a:extLst>
+              <a:ext uri="{FF2B5EF4-FFF2-40B4-BE49-F238E27FC236}">
+                <a16:creationId xmlns:a16="http://schemas.microsoft.com/office/drawing/2014/main" id="{D7540EB3-365D-4B5D-AB41-6C01469E3CB0}"/>
+              </a:ext>
+            </a:extLst>
+          </p:cNvPr>
+          <p:cNvPicPr>
+            <a:picLocks noChangeAspect="1"/>
+          </p:cNvPicPr>
+          <p:nvPr/>
+        </p:nvPicPr>
+        <p:blipFill>
+          <a:blip r:embed="rId4"/>
+          <a:stretch>
+            <a:fillRect/>
+          </a:stretch>
+        </p:blipFill>
+        <p:spPr>
+          <a:xfrm>
+            <a:off x="2025654" y="1042988"/>
+            <a:ext cx="2819400" cy="1590675"/>
+          </a:xfrm>
+          <a:prstGeom prst="rect">
+            <a:avLst/>
+          </a:prstGeom>
+        </p:spPr>
+      </p:pic>
+    </p:spTree>
+    <p:extLst>
+      <p:ext uri="{BB962C8B-B14F-4D97-AF65-F5344CB8AC3E}">
+        <p14:creationId xmlns:p14="http://schemas.microsoft.com/office/powerpoint/2010/main" val="519025307"/>
+      </p:ext>
+    </p:extLst>
+  </p:cSld>
+  <p:clrMapOvr>
+    <a:masterClrMapping/>
+  </p:clrMapOvr>
+</p:sld>
+</file>
+
+<file path=ppt/slides/slide12.xml><?xml version="1.0" encoding="utf-8"?>
+<p:sld xmlns:a="http://schemas.openxmlformats.org/drawingml/2006/main" xmlns:r="http://schemas.openxmlformats.org/officeDocument/2006/relationships" xmlns:p="http://schemas.openxmlformats.org/presentationml/2006/main">
+  <p:cSld>
+    <p:bg>
+      <p:bgPr>
+        <a:solidFill>
+          <a:schemeClr val="bg1"/>
+        </a:solidFill>
+        <a:effectLst/>
+      </p:bgPr>
+    </p:bg>
+    <p:spTree>
+      <p:nvGrpSpPr>
+        <p:cNvPr id="1" name=""/>
+        <p:cNvGrpSpPr/>
+        <p:nvPr/>
+      </p:nvGrpSpPr>
+      <p:grpSpPr>
+        <a:xfrm>
+          <a:off x="0" y="0"/>
+          <a:ext cx="0" cy="0"/>
+          <a:chOff x="0" y="0"/>
+          <a:chExt cx="0" cy="0"/>
+        </a:xfrm>
+      </p:grpSpPr>
+      <p:sp useBgFill="1">
+        <p:nvSpPr>
+          <p:cNvPr id="71" name="Rectangle 70">
+            <a:extLst>
+              <a:ext uri="{FF2B5EF4-FFF2-40B4-BE49-F238E27FC236}">
+                <a16:creationId xmlns:a16="http://schemas.microsoft.com/office/drawing/2014/main" id="{C1A1C5D3-C053-4EE9-BE1A-419B6E27CCAE}"/>
+              </a:ext>
+              <a:ext uri="{C183D7F6-B498-43B3-948B-1728B52AA6E4}">
+                <adec:decorative xmlns:adec="http://schemas.microsoft.com/office/drawing/2017/decorative" val="1"/>
+              </a:ext>
+            </a:extLst>
+          </p:cNvPr>
+          <p:cNvSpPr>
+            <a:spLocks noGrp="1" noRot="1" noChangeAspect="1" noMove="1" noResize="1" noEditPoints="1" noAdjustHandles="1" noChangeArrowheads="1" noChangeShapeType="1" noTextEdit="1"/>
+          </p:cNvSpPr>
+          <p:nvPr>
+            <p:extLst>
+              <p:ext uri="{386F3935-93C4-4BCD-93E2-E3B085C9AB24}">
+                <p16:designElem xmlns:p16="http://schemas.microsoft.com/office/powerpoint/2015/main" val="1"/>
+              </p:ext>
+            </p:extLst>
+          </p:nvPr>
+        </p:nvSpPr>
+        <p:spPr>
+          <a:xfrm>
+            <a:off x="0" y="0"/>
+            <a:ext cx="12192000" cy="6858000"/>
+          </a:xfrm>
+          <a:prstGeom prst="rect">
+            <a:avLst/>
+          </a:prstGeom>
+          <a:ln>
+            <a:noFill/>
+          </a:ln>
+        </p:spPr>
+        <p:style>
+          <a:lnRef idx="2">
+            <a:schemeClr val="accent1">
+              <a:shade val="50000"/>
+            </a:schemeClr>
+          </a:lnRef>
+          <a:fillRef idx="1">
+            <a:schemeClr val="accent1"/>
+          </a:fillRef>
+          <a:effectRef idx="0">
+            <a:schemeClr val="accent1"/>
+          </a:effectRef>
+          <a:fontRef idx="minor">
+            <a:schemeClr val="lt1"/>
+          </a:fontRef>
+        </p:style>
+        <p:txBody>
+          <a:bodyPr rtlCol="0" anchor="ctr"/>
+          <a:lstStyle/>
+          <a:p>
+            <a:pPr algn="ctr"/>
+            <a:endParaRPr lang="en-US" dirty="0"/>
+          </a:p>
+        </p:txBody>
+      </p:sp>
+      <p:sp useBgFill="1">
+        <p:nvSpPr>
+          <p:cNvPr id="73" name="Rectangle 72">
+            <a:extLst>
+              <a:ext uri="{FF2B5EF4-FFF2-40B4-BE49-F238E27FC236}">
+                <a16:creationId xmlns:a16="http://schemas.microsoft.com/office/drawing/2014/main" id="{A3473CF9-37EB-43E7-89EF-D2D1C53D1DAC}"/>
+              </a:ext>
+              <a:ext uri="{C183D7F6-B498-43B3-948B-1728B52AA6E4}">
+                <adec:decorative xmlns:adec="http://schemas.microsoft.com/office/drawing/2017/decorative" val="1"/>
+              </a:ext>
+            </a:extLst>
+          </p:cNvPr>
+          <p:cNvSpPr>
+            <a:spLocks noGrp="1" noRot="1" noChangeAspect="1" noMove="1" noResize="1" noEditPoints="1" noAdjustHandles="1" noChangeArrowheads="1" noChangeShapeType="1" noTextEdit="1"/>
+          </p:cNvSpPr>
+          <p:nvPr>
+            <p:extLst>
+              <p:ext uri="{386F3935-93C4-4BCD-93E2-E3B085C9AB24}">
+                <p16:designElem xmlns:p16="http://schemas.microsoft.com/office/powerpoint/2015/main" val="1"/>
+              </p:ext>
+            </p:extLst>
+          </p:nvPr>
+        </p:nvSpPr>
+        <p:spPr>
+          <a:xfrm>
+            <a:off x="1903615" y="221673"/>
+            <a:ext cx="8384770" cy="1332634"/>
+          </a:xfrm>
+          <a:prstGeom prst="rect">
+            <a:avLst/>
+          </a:prstGeom>
+          <a:ln w="12700">
+            <a:solidFill>
+              <a:srgbClr val="E1E1E1"/>
+            </a:solidFill>
+          </a:ln>
+          <a:effectLst>
+            <a:outerShdw blurRad="50800" dist="38100" dir="2700000" algn="tl" rotWithShape="0">
+              <a:schemeClr val="bg2">
+                <a:lumMod val="85000"/>
+                <a:alpha val="50000"/>
+              </a:schemeClr>
+            </a:outerShdw>
+          </a:effectLst>
+        </p:spPr>
+        <p:style>
+          <a:lnRef idx="2">
+            <a:schemeClr val="accent1">
+              <a:shade val="50000"/>
+            </a:schemeClr>
+          </a:lnRef>
+          <a:fillRef idx="1">
+            <a:schemeClr val="accent1"/>
+          </a:fillRef>
+          <a:effectRef idx="0">
+            <a:schemeClr val="accent1"/>
+          </a:effectRef>
+          <a:fontRef idx="minor">
+            <a:schemeClr val="lt1"/>
+          </a:fontRef>
+        </p:style>
+        <p:txBody>
+          <a:bodyPr rtlCol="0" anchor="ctr"/>
+          <a:lstStyle/>
+          <a:p>
+            <a:pPr marL="0" marR="0" lvl="0" indent="0" algn="ctr" defTabSz="914400" rtl="0" eaLnBrk="1" fontAlgn="auto" latinLnBrk="0" hangingPunct="1">
+              <a:lnSpc>
+                <a:spcPct val="100000"/>
+              </a:lnSpc>
+              <a:spcBef>
+                <a:spcPts val="0"/>
+              </a:spcBef>
+              <a:spcAft>
+                <a:spcPts val="0"/>
+              </a:spcAft>
+              <a:buClrTx/>
+              <a:buSzTx/>
+              <a:buFontTx/>
+              <a:buNone/>
+              <a:tabLst/>
+              <a:defRPr/>
+            </a:pPr>
+            <a:endParaRPr kumimoji="0" lang="en-US" sz="1800" b="0" i="0" u="none" strike="noStrike" kern="1200" cap="none" spc="0" normalizeH="0" baseline="0" noProof="0" dirty="0">
+              <a:ln>
+                <a:noFill/>
+              </a:ln>
+              <a:solidFill>
+                <a:prstClr val="white"/>
+              </a:solidFill>
+              <a:effectLst/>
+              <a:uLnTx/>
+              <a:uFillTx/>
+              <a:latin typeface="Calibri" panose="020F0502020204030204"/>
+              <a:ea typeface="+mn-ea"/>
+              <a:cs typeface="+mn-cs"/>
+            </a:endParaRPr>
+          </a:p>
+        </p:txBody>
+      </p:sp>
+      <p:sp>
+        <p:nvSpPr>
+          <p:cNvPr id="2" name="Title 1">
+            <a:extLst>
+              <a:ext uri="{FF2B5EF4-FFF2-40B4-BE49-F238E27FC236}">
+                <a16:creationId xmlns:a16="http://schemas.microsoft.com/office/drawing/2014/main" id="{0FDE5079-B185-4DE0-AF2C-AE4B7709FBC3}"/>
+              </a:ext>
+            </a:extLst>
+          </p:cNvPr>
+          <p:cNvSpPr>
+            <a:spLocks noGrp="1"/>
+          </p:cNvSpPr>
+          <p:nvPr>
+            <p:ph type="title"/>
+          </p:nvPr>
+        </p:nvSpPr>
+        <p:spPr>
+          <a:xfrm>
+            <a:off x="2103121" y="310343"/>
+            <a:ext cx="7985759" cy="868823"/>
+          </a:xfrm>
+        </p:spPr>
+        <p:txBody>
+          <a:bodyPr vert="horz" lIns="91440" tIns="45720" rIns="91440" bIns="45720" rtlCol="0" anchor="ctr">
+            <a:normAutofit/>
+          </a:bodyPr>
+          <a:lstStyle/>
+          <a:p>
+            <a:pPr algn="ctr"/>
+            <a:r>
+              <a:rPr lang="en-US" sz="4000" kern="1200" dirty="0">
+                <a:solidFill>
+                  <a:schemeClr val="tx1"/>
+                </a:solidFill>
+                <a:latin typeface="+mj-lt"/>
+                <a:ea typeface="+mj-ea"/>
+                <a:cs typeface="+mj-cs"/>
+              </a:rPr>
+              <a:t>Mock-ups</a:t>
+            </a:r>
+          </a:p>
+        </p:txBody>
+      </p:sp>
+      <p:sp>
+        <p:nvSpPr>
+          <p:cNvPr id="75" name="Rectangle: Rounded Corners 74">
+            <a:extLst>
+              <a:ext uri="{FF2B5EF4-FFF2-40B4-BE49-F238E27FC236}">
+                <a16:creationId xmlns:a16="http://schemas.microsoft.com/office/drawing/2014/main" id="{586B4EF9-43BA-4655-A6FF-1D8E21574C95}"/>
+              </a:ext>
+              <a:ext uri="{C183D7F6-B498-43B3-948B-1728B52AA6E4}">
+                <adec:decorative xmlns:adec="http://schemas.microsoft.com/office/drawing/2017/decorative" val="1"/>
+              </a:ext>
+            </a:extLst>
+          </p:cNvPr>
+          <p:cNvSpPr>
+            <a:spLocks noGrp="1" noRot="1" noChangeAspect="1" noMove="1" noResize="1" noEditPoints="1" noAdjustHandles="1" noChangeArrowheads="1" noChangeShapeType="1" noTextEdit="1"/>
+          </p:cNvSpPr>
+          <p:nvPr>
+            <p:extLst>
+              <p:ext uri="{386F3935-93C4-4BCD-93E2-E3B085C9AB24}">
+                <p16:designElem xmlns:p16="http://schemas.microsoft.com/office/powerpoint/2015/main" val="1"/>
+              </p:ext>
+            </p:extLst>
+          </p:nvPr>
+        </p:nvSpPr>
+        <p:spPr>
+          <a:xfrm>
+            <a:off x="2483110" y="1211407"/>
+            <a:ext cx="7225780" cy="685800"/>
+          </a:xfrm>
+          <a:prstGeom prst="roundRect">
+            <a:avLst>
+              <a:gd name="adj" fmla="val 0"/>
+            </a:avLst>
+          </a:prstGeom>
+          <a:solidFill>
+            <a:schemeClr val="accent2"/>
+          </a:solidFill>
+          <a:ln>
+            <a:noFill/>
+          </a:ln>
+        </p:spPr>
+        <p:style>
+          <a:lnRef idx="2">
+            <a:schemeClr val="accent1">
+              <a:shade val="50000"/>
+            </a:schemeClr>
+          </a:lnRef>
+          <a:fillRef idx="1">
+            <a:schemeClr val="accent1"/>
+          </a:fillRef>
+          <a:effectRef idx="0">
+            <a:schemeClr val="accent1"/>
+          </a:effectRef>
+          <a:fontRef idx="minor">
+            <a:schemeClr val="lt1"/>
+          </a:fontRef>
+        </p:style>
+        <p:txBody>
+          <a:bodyPr rtlCol="0" anchor="ctr"/>
+          <a:lstStyle/>
+          <a:p>
+            <a:pPr algn="ctr"/>
+            <a:endParaRPr lang="en-US" dirty="0">
+              <a:solidFill>
+                <a:prstClr val="white"/>
+              </a:solidFill>
+              <a:latin typeface="Calibri" panose="020F0502020204030204"/>
+            </a:endParaRPr>
+          </a:p>
+        </p:txBody>
+      </p:sp>
     </p:spTree>
     <p:extLst>
       <p:ext uri="{BB962C8B-B14F-4D97-AF65-F5344CB8AC3E}">
@@ -7292,7 +7952,7 @@
 </p:sld>
 </file>
 
-<file path=ppt/slides/slide11.xml><?xml version="1.0" encoding="utf-8"?>
+<file path=ppt/slides/slide13.xml><?xml version="1.0" encoding="utf-8"?>
 <p:sld xmlns:a="http://schemas.openxmlformats.org/drawingml/2006/main" xmlns:r="http://schemas.openxmlformats.org/officeDocument/2006/relationships" xmlns:p="http://schemas.openxmlformats.org/presentationml/2006/main">
   <p:cSld>
     <p:bg>
@@ -8463,6 +9123,301 @@
 <file path=ppt/slides/slide3.xml><?xml version="1.0" encoding="utf-8"?>
 <p:sld xmlns:a="http://schemas.openxmlformats.org/drawingml/2006/main" xmlns:r="http://schemas.openxmlformats.org/officeDocument/2006/relationships" xmlns:p="http://schemas.openxmlformats.org/presentationml/2006/main">
   <p:cSld>
+    <p:spTree>
+      <p:nvGrpSpPr>
+        <p:cNvPr id="1" name=""/>
+        <p:cNvGrpSpPr/>
+        <p:nvPr/>
+      </p:nvGrpSpPr>
+      <p:grpSpPr>
+        <a:xfrm>
+          <a:off x="0" y="0"/>
+          <a:ext cx="0" cy="0"/>
+          <a:chOff x="0" y="0"/>
+          <a:chExt cx="0" cy="0"/>
+        </a:xfrm>
+      </p:grpSpPr>
+      <p:sp>
+        <p:nvSpPr>
+          <p:cNvPr id="2" name="Title 1">
+            <a:extLst>
+              <a:ext uri="{FF2B5EF4-FFF2-40B4-BE49-F238E27FC236}">
+                <a16:creationId xmlns:a16="http://schemas.microsoft.com/office/drawing/2014/main" id="{3D9AB449-5692-402C-87A1-3CB34FC97E90}"/>
+              </a:ext>
+            </a:extLst>
+          </p:cNvPr>
+          <p:cNvSpPr>
+            <a:spLocks noGrp="1"/>
+          </p:cNvSpPr>
+          <p:nvPr>
+            <p:ph type="title"/>
+          </p:nvPr>
+        </p:nvSpPr>
+        <p:spPr/>
+        <p:txBody>
+          <a:bodyPr/>
+          <a:lstStyle/>
+          <a:p>
+            <a:r>
+              <a:rPr lang="en-US" dirty="0"/>
+              <a:t>Trello</a:t>
+            </a:r>
+          </a:p>
+        </p:txBody>
+      </p:sp>
+      <p:pic>
+        <p:nvPicPr>
+          <p:cNvPr id="5" name="Content Placeholder 4" descr="A screenshot of a cell phone&#10;&#10;Description automatically generated">
+            <a:extLst>
+              <a:ext uri="{FF2B5EF4-FFF2-40B4-BE49-F238E27FC236}">
+                <a16:creationId xmlns:a16="http://schemas.microsoft.com/office/drawing/2014/main" id="{9B033EA9-4120-4DF7-9507-D5D7EE18488F}"/>
+              </a:ext>
+            </a:extLst>
+          </p:cNvPr>
+          <p:cNvPicPr>
+            <a:picLocks noGrp="1" noChangeAspect="1"/>
+          </p:cNvPicPr>
+          <p:nvPr>
+            <p:ph idx="1"/>
+          </p:nvPr>
+        </p:nvPicPr>
+        <p:blipFill>
+          <a:blip r:embed="rId2">
+            <a:extLst>
+              <a:ext uri="{28A0092B-C50C-407E-A947-70E740481C1C}">
+                <a14:useLocalDpi xmlns:a14="http://schemas.microsoft.com/office/drawing/2010/main" val="0"/>
+              </a:ext>
+            </a:extLst>
+          </a:blip>
+          <a:stretch>
+            <a:fillRect/>
+          </a:stretch>
+        </p:blipFill>
+        <p:spPr>
+          <a:xfrm>
+            <a:off x="8243680" y="2975473"/>
+            <a:ext cx="3639510" cy="3385322"/>
+          </a:xfrm>
+        </p:spPr>
+      </p:pic>
+      <p:pic>
+        <p:nvPicPr>
+          <p:cNvPr id="7" name="Picture 6" descr="A screenshot of a social media post&#10;&#10;Description automatically generated">
+            <a:extLst>
+              <a:ext uri="{FF2B5EF4-FFF2-40B4-BE49-F238E27FC236}">
+                <a16:creationId xmlns:a16="http://schemas.microsoft.com/office/drawing/2014/main" id="{D2EEBF16-7210-432D-B7C2-3B21DFBB6549}"/>
+              </a:ext>
+            </a:extLst>
+          </p:cNvPr>
+          <p:cNvPicPr>
+            <a:picLocks noChangeAspect="1"/>
+          </p:cNvPicPr>
+          <p:nvPr/>
+        </p:nvPicPr>
+        <p:blipFill>
+          <a:blip r:embed="rId3">
+            <a:extLst>
+              <a:ext uri="{28A0092B-C50C-407E-A947-70E740481C1C}">
+                <a14:useLocalDpi xmlns:a14="http://schemas.microsoft.com/office/drawing/2010/main" val="0"/>
+              </a:ext>
+            </a:extLst>
+          </a:blip>
+          <a:stretch>
+            <a:fillRect/>
+          </a:stretch>
+        </p:blipFill>
+        <p:spPr>
+          <a:xfrm>
+            <a:off x="410410" y="1690688"/>
+            <a:ext cx="4417282" cy="3316219"/>
+          </a:xfrm>
+          <a:prstGeom prst="rect">
+            <a:avLst/>
+          </a:prstGeom>
+        </p:spPr>
+      </p:pic>
+    </p:spTree>
+    <p:extLst>
+      <p:ext uri="{BB962C8B-B14F-4D97-AF65-F5344CB8AC3E}">
+        <p14:creationId xmlns:p14="http://schemas.microsoft.com/office/powerpoint/2010/main" val="3431884766"/>
+      </p:ext>
+    </p:extLst>
+  </p:cSld>
+  <p:clrMapOvr>
+    <a:masterClrMapping/>
+  </p:clrMapOvr>
+</p:sld>
+</file>
+
+<file path=ppt/slides/slide4.xml><?xml version="1.0" encoding="utf-8"?>
+<p:sld xmlns:a="http://schemas.openxmlformats.org/drawingml/2006/main" xmlns:r="http://schemas.openxmlformats.org/officeDocument/2006/relationships" xmlns:p="http://schemas.openxmlformats.org/presentationml/2006/main">
+  <p:cSld>
+    <p:spTree>
+      <p:nvGrpSpPr>
+        <p:cNvPr id="1" name=""/>
+        <p:cNvGrpSpPr/>
+        <p:nvPr/>
+      </p:nvGrpSpPr>
+      <p:grpSpPr>
+        <a:xfrm>
+          <a:off x="0" y="0"/>
+          <a:ext cx="0" cy="0"/>
+          <a:chOff x="0" y="0"/>
+          <a:chExt cx="0" cy="0"/>
+        </a:xfrm>
+      </p:grpSpPr>
+      <p:sp>
+        <p:nvSpPr>
+          <p:cNvPr id="2" name="Title 1">
+            <a:extLst>
+              <a:ext uri="{FF2B5EF4-FFF2-40B4-BE49-F238E27FC236}">
+                <a16:creationId xmlns:a16="http://schemas.microsoft.com/office/drawing/2014/main" id="{1334FB56-4D11-4019-974B-0EE40A820B62}"/>
+              </a:ext>
+            </a:extLst>
+          </p:cNvPr>
+          <p:cNvSpPr>
+            <a:spLocks noGrp="1"/>
+          </p:cNvSpPr>
+          <p:nvPr>
+            <p:ph type="title"/>
+          </p:nvPr>
+        </p:nvSpPr>
+        <p:spPr/>
+        <p:txBody>
+          <a:bodyPr/>
+          <a:lstStyle/>
+          <a:p>
+            <a:r>
+              <a:rPr lang="en-US" dirty="0" err="1"/>
+              <a:t>Github</a:t>
+            </a:r>
+            <a:endParaRPr lang="en-US" dirty="0"/>
+          </a:p>
+        </p:txBody>
+      </p:sp>
+      <p:pic>
+        <p:nvPicPr>
+          <p:cNvPr id="5" name="Content Placeholder 4" descr="A screenshot of a cell phone&#10;&#10;Description automatically generated">
+            <a:extLst>
+              <a:ext uri="{FF2B5EF4-FFF2-40B4-BE49-F238E27FC236}">
+                <a16:creationId xmlns:a16="http://schemas.microsoft.com/office/drawing/2014/main" id="{4EDBE5E4-8833-499A-91D4-08D0083B2AB9}"/>
+              </a:ext>
+            </a:extLst>
+          </p:cNvPr>
+          <p:cNvPicPr>
+            <a:picLocks noGrp="1" noChangeAspect="1"/>
+          </p:cNvPicPr>
+          <p:nvPr>
+            <p:ph idx="1"/>
+          </p:nvPr>
+        </p:nvPicPr>
+        <p:blipFill>
+          <a:blip r:embed="rId2">
+            <a:extLst>
+              <a:ext uri="{28A0092B-C50C-407E-A947-70E740481C1C}">
+                <a14:useLocalDpi xmlns:a14="http://schemas.microsoft.com/office/drawing/2010/main" val="0"/>
+              </a:ext>
+            </a:extLst>
+          </a:blip>
+          <a:stretch>
+            <a:fillRect/>
+          </a:stretch>
+        </p:blipFill>
+        <p:spPr>
+          <a:xfrm>
+            <a:off x="6470627" y="4132935"/>
+            <a:ext cx="5084943" cy="2367298"/>
+          </a:xfrm>
+        </p:spPr>
+      </p:pic>
+      <p:pic>
+        <p:nvPicPr>
+          <p:cNvPr id="7" name="Picture 6" descr="A screenshot of a social media post&#10;&#10;Description automatically generated">
+            <a:extLst>
+              <a:ext uri="{FF2B5EF4-FFF2-40B4-BE49-F238E27FC236}">
+                <a16:creationId xmlns:a16="http://schemas.microsoft.com/office/drawing/2014/main" id="{89A27AC0-15D2-458F-AB97-FA4F6222D393}"/>
+              </a:ext>
+            </a:extLst>
+          </p:cNvPr>
+          <p:cNvPicPr>
+            <a:picLocks noChangeAspect="1"/>
+          </p:cNvPicPr>
+          <p:nvPr/>
+        </p:nvPicPr>
+        <p:blipFill>
+          <a:blip r:embed="rId3">
+            <a:extLst>
+              <a:ext uri="{28A0092B-C50C-407E-A947-70E740481C1C}">
+                <a14:useLocalDpi xmlns:a14="http://schemas.microsoft.com/office/drawing/2010/main" val="0"/>
+              </a:ext>
+            </a:extLst>
+          </a:blip>
+          <a:stretch>
+            <a:fillRect/>
+          </a:stretch>
+        </p:blipFill>
+        <p:spPr>
+          <a:xfrm>
+            <a:off x="6018537" y="414373"/>
+            <a:ext cx="5989125" cy="3469429"/>
+          </a:xfrm>
+          <a:prstGeom prst="rect">
+            <a:avLst/>
+          </a:prstGeom>
+        </p:spPr>
+      </p:pic>
+      <p:pic>
+        <p:nvPicPr>
+          <p:cNvPr id="9" name="Picture 8" descr="A screenshot of a cell phone&#10;&#10;Description automatically generated">
+            <a:extLst>
+              <a:ext uri="{FF2B5EF4-FFF2-40B4-BE49-F238E27FC236}">
+                <a16:creationId xmlns:a16="http://schemas.microsoft.com/office/drawing/2014/main" id="{BE7BAC33-851C-4BDA-81BB-EA6754EFD3DD}"/>
+              </a:ext>
+            </a:extLst>
+          </p:cNvPr>
+          <p:cNvPicPr>
+            <a:picLocks noChangeAspect="1"/>
+          </p:cNvPicPr>
+          <p:nvPr/>
+        </p:nvPicPr>
+        <p:blipFill>
+          <a:blip r:embed="rId4">
+            <a:extLst>
+              <a:ext uri="{28A0092B-C50C-407E-A947-70E740481C1C}">
+                <a14:useLocalDpi xmlns:a14="http://schemas.microsoft.com/office/drawing/2010/main" val="0"/>
+              </a:ext>
+            </a:extLst>
+          </a:blip>
+          <a:stretch>
+            <a:fillRect/>
+          </a:stretch>
+        </p:blipFill>
+        <p:spPr>
+          <a:xfrm>
+            <a:off x="621218" y="4053841"/>
+            <a:ext cx="2244373" cy="2525486"/>
+          </a:xfrm>
+          <a:prstGeom prst="rect">
+            <a:avLst/>
+          </a:prstGeom>
+        </p:spPr>
+      </p:pic>
+    </p:spTree>
+    <p:extLst>
+      <p:ext uri="{BB962C8B-B14F-4D97-AF65-F5344CB8AC3E}">
+        <p14:creationId xmlns:p14="http://schemas.microsoft.com/office/powerpoint/2010/main" val="4039153521"/>
+      </p:ext>
+    </p:extLst>
+  </p:cSld>
+  <p:clrMapOvr>
+    <a:masterClrMapping/>
+  </p:clrMapOvr>
+</p:sld>
+</file>
+
+<file path=ppt/slides/slide5.xml><?xml version="1.0" encoding="utf-8"?>
+<p:sld xmlns:a="http://schemas.openxmlformats.org/drawingml/2006/main" xmlns:r="http://schemas.openxmlformats.org/officeDocument/2006/relationships" xmlns:p="http://schemas.openxmlformats.org/presentationml/2006/main">
+  <p:cSld>
     <p:bg>
       <p:bgPr>
         <a:solidFill>
@@ -8816,7 +9771,7 @@
 </p:sld>
 </file>
 
-<file path=ppt/slides/slide4.xml><?xml version="1.0" encoding="utf-8"?>
+<file path=ppt/slides/slide6.xml><?xml version="1.0" encoding="utf-8"?>
 <p:sld xmlns:a="http://schemas.openxmlformats.org/drawingml/2006/main" xmlns:r="http://schemas.openxmlformats.org/officeDocument/2006/relationships" xmlns:p="http://schemas.openxmlformats.org/presentationml/2006/main">
   <p:cSld>
     <p:bg>
@@ -9268,7 +10223,7 @@
 </p:sld>
 </file>
 
-<file path=ppt/slides/slide5.xml><?xml version="1.0" encoding="utf-8"?>
+<file path=ppt/slides/slide7.xml><?xml version="1.0" encoding="utf-8"?>
 <p:sld xmlns:a="http://schemas.openxmlformats.org/drawingml/2006/main" xmlns:r="http://schemas.openxmlformats.org/officeDocument/2006/relationships" xmlns:p="http://schemas.openxmlformats.org/presentationml/2006/main">
   <p:cSld>
     <p:bg>
@@ -9578,7 +10533,7 @@
 </p:sld>
 </file>
 
-<file path=ppt/slides/slide6.xml><?xml version="1.0" encoding="utf-8"?>
+<file path=ppt/slides/slide8.xml><?xml version="1.0" encoding="utf-8"?>
 <p:sld xmlns:a="http://schemas.openxmlformats.org/drawingml/2006/main" xmlns:r="http://schemas.openxmlformats.org/officeDocument/2006/relationships" xmlns:p="http://schemas.openxmlformats.org/presentationml/2006/main">
   <p:cSld>
     <p:bg>
@@ -9888,7 +10843,7 @@
 </p:sld>
 </file>
 
-<file path=ppt/slides/slide7.xml><?xml version="1.0" encoding="utf-8"?>
+<file path=ppt/slides/slide9.xml><?xml version="1.0" encoding="utf-8"?>
 <p:sld xmlns:a="http://schemas.openxmlformats.org/drawingml/2006/main" xmlns:r="http://schemas.openxmlformats.org/officeDocument/2006/relationships" xmlns:p="http://schemas.openxmlformats.org/presentationml/2006/main">
   <p:cSld>
     <p:bg>
@@ -10189,664 +11144,6 @@
     <p:extLst>
       <p:ext uri="{BB962C8B-B14F-4D97-AF65-F5344CB8AC3E}">
         <p14:creationId xmlns:p14="http://schemas.microsoft.com/office/powerpoint/2010/main" val="2730560187"/>
-      </p:ext>
-    </p:extLst>
-  </p:cSld>
-  <p:clrMapOvr>
-    <a:masterClrMapping/>
-  </p:clrMapOvr>
-</p:sld>
-</file>
-
-<file path=ppt/slides/slide8.xml><?xml version="1.0" encoding="utf-8"?>
-<p:sld xmlns:a="http://schemas.openxmlformats.org/drawingml/2006/main" xmlns:r="http://schemas.openxmlformats.org/officeDocument/2006/relationships" xmlns:p="http://schemas.openxmlformats.org/presentationml/2006/main">
-  <p:cSld>
-    <p:bg>
-      <p:bgPr>
-        <a:solidFill>
-          <a:schemeClr val="bg1"/>
-        </a:solidFill>
-        <a:effectLst/>
-      </p:bgPr>
-    </p:bg>
-    <p:spTree>
-      <p:nvGrpSpPr>
-        <p:cNvPr id="1" name=""/>
-        <p:cNvGrpSpPr/>
-        <p:nvPr/>
-      </p:nvGrpSpPr>
-      <p:grpSpPr>
-        <a:xfrm>
-          <a:off x="0" y="0"/>
-          <a:ext cx="0" cy="0"/>
-          <a:chOff x="0" y="0"/>
-          <a:chExt cx="0" cy="0"/>
-        </a:xfrm>
-      </p:grpSpPr>
-      <p:sp useBgFill="1">
-        <p:nvSpPr>
-          <p:cNvPr id="71" name="Rectangle 70">
-            <a:extLst>
-              <a:ext uri="{FF2B5EF4-FFF2-40B4-BE49-F238E27FC236}">
-                <a16:creationId xmlns:a16="http://schemas.microsoft.com/office/drawing/2014/main" id="{C1A1C5D3-C053-4EE9-BE1A-419B6E27CCAE}"/>
-              </a:ext>
-              <a:ext uri="{C183D7F6-B498-43B3-948B-1728B52AA6E4}">
-                <adec:decorative xmlns:adec="http://schemas.microsoft.com/office/drawing/2017/decorative" val="1"/>
-              </a:ext>
-            </a:extLst>
-          </p:cNvPr>
-          <p:cNvSpPr>
-            <a:spLocks noGrp="1" noRot="1" noChangeAspect="1" noMove="1" noResize="1" noEditPoints="1" noAdjustHandles="1" noChangeArrowheads="1" noChangeShapeType="1" noTextEdit="1"/>
-          </p:cNvSpPr>
-          <p:nvPr>
-            <p:extLst>
-              <p:ext uri="{386F3935-93C4-4BCD-93E2-E3B085C9AB24}">
-                <p16:designElem xmlns:p16="http://schemas.microsoft.com/office/powerpoint/2015/main" val="1"/>
-              </p:ext>
-            </p:extLst>
-          </p:nvPr>
-        </p:nvSpPr>
-        <p:spPr>
-          <a:xfrm>
-            <a:off x="0" y="0"/>
-            <a:ext cx="12192000" cy="6858000"/>
-          </a:xfrm>
-          <a:prstGeom prst="rect">
-            <a:avLst/>
-          </a:prstGeom>
-          <a:ln>
-            <a:noFill/>
-          </a:ln>
-        </p:spPr>
-        <p:style>
-          <a:lnRef idx="2">
-            <a:schemeClr val="accent1">
-              <a:shade val="50000"/>
-            </a:schemeClr>
-          </a:lnRef>
-          <a:fillRef idx="1">
-            <a:schemeClr val="accent1"/>
-          </a:fillRef>
-          <a:effectRef idx="0">
-            <a:schemeClr val="accent1"/>
-          </a:effectRef>
-          <a:fontRef idx="minor">
-            <a:schemeClr val="lt1"/>
-          </a:fontRef>
-        </p:style>
-        <p:txBody>
-          <a:bodyPr rtlCol="0" anchor="ctr"/>
-          <a:lstStyle/>
-          <a:p>
-            <a:pPr algn="ctr"/>
-            <a:endParaRPr lang="en-US" dirty="0"/>
-          </a:p>
-        </p:txBody>
-      </p:sp>
-      <p:sp useBgFill="1">
-        <p:nvSpPr>
-          <p:cNvPr id="73" name="Rectangle 72">
-            <a:extLst>
-              <a:ext uri="{FF2B5EF4-FFF2-40B4-BE49-F238E27FC236}">
-                <a16:creationId xmlns:a16="http://schemas.microsoft.com/office/drawing/2014/main" id="{A3473CF9-37EB-43E7-89EF-D2D1C53D1DAC}"/>
-              </a:ext>
-              <a:ext uri="{C183D7F6-B498-43B3-948B-1728B52AA6E4}">
-                <adec:decorative xmlns:adec="http://schemas.microsoft.com/office/drawing/2017/decorative" val="1"/>
-              </a:ext>
-            </a:extLst>
-          </p:cNvPr>
-          <p:cNvSpPr>
-            <a:spLocks noGrp="1" noRot="1" noChangeAspect="1" noMove="1" noResize="1" noEditPoints="1" noAdjustHandles="1" noChangeArrowheads="1" noChangeShapeType="1" noTextEdit="1"/>
-          </p:cNvSpPr>
-          <p:nvPr>
-            <p:extLst>
-              <p:ext uri="{386F3935-93C4-4BCD-93E2-E3B085C9AB24}">
-                <p16:designElem xmlns:p16="http://schemas.microsoft.com/office/powerpoint/2015/main" val="1"/>
-              </p:ext>
-            </p:extLst>
-          </p:nvPr>
-        </p:nvSpPr>
-        <p:spPr>
-          <a:xfrm>
-            <a:off x="1903615" y="221673"/>
-            <a:ext cx="8384770" cy="1332634"/>
-          </a:xfrm>
-          <a:prstGeom prst="rect">
-            <a:avLst/>
-          </a:prstGeom>
-          <a:ln w="12700">
-            <a:solidFill>
-              <a:srgbClr val="E1E1E1"/>
-            </a:solidFill>
-          </a:ln>
-          <a:effectLst>
-            <a:outerShdw blurRad="50800" dist="38100" dir="2700000" algn="tl" rotWithShape="0">
-              <a:schemeClr val="bg2">
-                <a:lumMod val="85000"/>
-                <a:alpha val="50000"/>
-              </a:schemeClr>
-            </a:outerShdw>
-          </a:effectLst>
-        </p:spPr>
-        <p:style>
-          <a:lnRef idx="2">
-            <a:schemeClr val="accent1">
-              <a:shade val="50000"/>
-            </a:schemeClr>
-          </a:lnRef>
-          <a:fillRef idx="1">
-            <a:schemeClr val="accent1"/>
-          </a:fillRef>
-          <a:effectRef idx="0">
-            <a:schemeClr val="accent1"/>
-          </a:effectRef>
-          <a:fontRef idx="minor">
-            <a:schemeClr val="lt1"/>
-          </a:fontRef>
-        </p:style>
-        <p:txBody>
-          <a:bodyPr rtlCol="0" anchor="ctr"/>
-          <a:lstStyle/>
-          <a:p>
-            <a:pPr marL="0" marR="0" lvl="0" indent="0" algn="ctr" defTabSz="914400" rtl="0" eaLnBrk="1" fontAlgn="auto" latinLnBrk="0" hangingPunct="1">
-              <a:lnSpc>
-                <a:spcPct val="100000"/>
-              </a:lnSpc>
-              <a:spcBef>
-                <a:spcPts val="0"/>
-              </a:spcBef>
-              <a:spcAft>
-                <a:spcPts val="0"/>
-              </a:spcAft>
-              <a:buClrTx/>
-              <a:buSzTx/>
-              <a:buFontTx/>
-              <a:buNone/>
-              <a:tabLst/>
-              <a:defRPr/>
-            </a:pPr>
-            <a:endParaRPr kumimoji="0" lang="en-US" sz="1800" b="0" i="0" u="none" strike="noStrike" kern="1200" cap="none" spc="0" normalizeH="0" baseline="0" noProof="0" dirty="0">
-              <a:ln>
-                <a:noFill/>
-              </a:ln>
-              <a:solidFill>
-                <a:prstClr val="white"/>
-              </a:solidFill>
-              <a:effectLst/>
-              <a:uLnTx/>
-              <a:uFillTx/>
-              <a:latin typeface="Calibri" panose="020F0502020204030204"/>
-              <a:ea typeface="+mn-ea"/>
-              <a:cs typeface="+mn-cs"/>
-            </a:endParaRPr>
-          </a:p>
-        </p:txBody>
-      </p:sp>
-      <p:sp>
-        <p:nvSpPr>
-          <p:cNvPr id="2" name="Title 1">
-            <a:extLst>
-              <a:ext uri="{FF2B5EF4-FFF2-40B4-BE49-F238E27FC236}">
-                <a16:creationId xmlns:a16="http://schemas.microsoft.com/office/drawing/2014/main" id="{0FDE5079-B185-4DE0-AF2C-AE4B7709FBC3}"/>
-              </a:ext>
-            </a:extLst>
-          </p:cNvPr>
-          <p:cNvSpPr>
-            <a:spLocks noGrp="1"/>
-          </p:cNvSpPr>
-          <p:nvPr>
-            <p:ph type="title"/>
-          </p:nvPr>
-        </p:nvSpPr>
-        <p:spPr>
-          <a:xfrm>
-            <a:off x="2103121" y="310343"/>
-            <a:ext cx="7985759" cy="868823"/>
-          </a:xfrm>
-        </p:spPr>
-        <p:txBody>
-          <a:bodyPr vert="horz" lIns="91440" tIns="45720" rIns="91440" bIns="45720" rtlCol="0" anchor="ctr">
-            <a:normAutofit/>
-          </a:bodyPr>
-          <a:lstStyle/>
-          <a:p>
-            <a:pPr algn="ctr"/>
-            <a:r>
-              <a:rPr lang="en-US" sz="4000" dirty="0"/>
-              <a:t>AWS </a:t>
-            </a:r>
-            <a:r>
-              <a:rPr lang="en-US" sz="4000" dirty="0" err="1"/>
-              <a:t>CodeBuild</a:t>
-            </a:r>
-            <a:endParaRPr lang="en-US" sz="4000" kern="1200" dirty="0">
-              <a:solidFill>
-                <a:schemeClr val="tx1"/>
-              </a:solidFill>
-              <a:latin typeface="+mj-lt"/>
-              <a:ea typeface="+mj-ea"/>
-              <a:cs typeface="+mj-cs"/>
-            </a:endParaRPr>
-          </a:p>
-        </p:txBody>
-      </p:sp>
-      <p:sp>
-        <p:nvSpPr>
-          <p:cNvPr id="75" name="Rectangle: Rounded Corners 74">
-            <a:extLst>
-              <a:ext uri="{FF2B5EF4-FFF2-40B4-BE49-F238E27FC236}">
-                <a16:creationId xmlns:a16="http://schemas.microsoft.com/office/drawing/2014/main" id="{586B4EF9-43BA-4655-A6FF-1D8E21574C95}"/>
-              </a:ext>
-              <a:ext uri="{C183D7F6-B498-43B3-948B-1728B52AA6E4}">
-                <adec:decorative xmlns:adec="http://schemas.microsoft.com/office/drawing/2017/decorative" val="1"/>
-              </a:ext>
-            </a:extLst>
-          </p:cNvPr>
-          <p:cNvSpPr>
-            <a:spLocks noGrp="1" noRot="1" noChangeAspect="1" noMove="1" noResize="1" noEditPoints="1" noAdjustHandles="1" noChangeArrowheads="1" noChangeShapeType="1" noTextEdit="1"/>
-          </p:cNvSpPr>
-          <p:nvPr>
-            <p:extLst>
-              <p:ext uri="{386F3935-93C4-4BCD-93E2-E3B085C9AB24}">
-                <p16:designElem xmlns:p16="http://schemas.microsoft.com/office/powerpoint/2015/main" val="1"/>
-              </p:ext>
-            </p:extLst>
-          </p:nvPr>
-        </p:nvSpPr>
-        <p:spPr>
-          <a:xfrm>
-            <a:off x="2483110" y="1211407"/>
-            <a:ext cx="7225780" cy="685800"/>
-          </a:xfrm>
-          <a:prstGeom prst="roundRect">
-            <a:avLst>
-              <a:gd name="adj" fmla="val 0"/>
-            </a:avLst>
-          </a:prstGeom>
-          <a:solidFill>
-            <a:schemeClr val="accent2"/>
-          </a:solidFill>
-          <a:ln>
-            <a:noFill/>
-          </a:ln>
-        </p:spPr>
-        <p:style>
-          <a:lnRef idx="2">
-            <a:schemeClr val="accent1">
-              <a:shade val="50000"/>
-            </a:schemeClr>
-          </a:lnRef>
-          <a:fillRef idx="1">
-            <a:schemeClr val="accent1"/>
-          </a:fillRef>
-          <a:effectRef idx="0">
-            <a:schemeClr val="accent1"/>
-          </a:effectRef>
-          <a:fontRef idx="minor">
-            <a:schemeClr val="lt1"/>
-          </a:fontRef>
-        </p:style>
-        <p:txBody>
-          <a:bodyPr rtlCol="0" anchor="ctr"/>
-          <a:lstStyle/>
-          <a:p>
-            <a:pPr algn="ctr"/>
-            <a:endParaRPr lang="en-US" dirty="0">
-              <a:solidFill>
-                <a:prstClr val="white"/>
-              </a:solidFill>
-              <a:latin typeface="Calibri" panose="020F0502020204030204"/>
-            </a:endParaRPr>
-          </a:p>
-        </p:txBody>
-      </p:sp>
-      <p:sp>
-        <p:nvSpPr>
-          <p:cNvPr id="3" name="TextBox 2">
-            <a:extLst>
-              <a:ext uri="{FF2B5EF4-FFF2-40B4-BE49-F238E27FC236}">
-                <a16:creationId xmlns:a16="http://schemas.microsoft.com/office/drawing/2014/main" id="{3DA47A83-3C4B-4A44-A497-1DB8B4E3B592}"/>
-              </a:ext>
-            </a:extLst>
-          </p:cNvPr>
-          <p:cNvSpPr txBox="1"/>
-          <p:nvPr/>
-        </p:nvSpPr>
-        <p:spPr>
-          <a:xfrm>
-            <a:off x="1090670" y="2375471"/>
-            <a:ext cx="10113484" cy="4204356"/>
-          </a:xfrm>
-          <a:prstGeom prst="rect">
-            <a:avLst/>
-          </a:prstGeom>
-          <a:noFill/>
-        </p:spPr>
-        <p:txBody>
-          <a:bodyPr wrap="square" rtlCol="0">
-            <a:spAutoFit/>
-          </a:bodyPr>
-          <a:lstStyle/>
-          <a:p>
-            <a:pPr marL="285750" indent="-285750">
-              <a:lnSpc>
-                <a:spcPct val="150000"/>
-              </a:lnSpc>
-              <a:buFont typeface="Arial" panose="020B0604020202020204" pitchFamily="34" charset="0"/>
-              <a:buChar char="•"/>
-            </a:pPr>
-            <a:r>
-              <a:rPr lang="en-US" dirty="0"/>
-              <a:t>Build service, which compiles source code, runs tests, and produces artifacts</a:t>
-            </a:r>
-          </a:p>
-          <a:p>
-            <a:pPr marL="285750" indent="-285750">
-              <a:lnSpc>
-                <a:spcPct val="150000"/>
-              </a:lnSpc>
-              <a:buFont typeface="Arial" panose="020B0604020202020204" pitchFamily="34" charset="0"/>
-              <a:buChar char="•"/>
-            </a:pPr>
-            <a:r>
-              <a:rPr lang="en-US" dirty="0"/>
-              <a:t>Pulls source code from </a:t>
-            </a:r>
-            <a:r>
-              <a:rPr lang="en-US" dirty="0" err="1"/>
-              <a:t>CodeCommit</a:t>
-            </a:r>
-            <a:r>
-              <a:rPr lang="en-US" dirty="0"/>
-              <a:t>, Amazon S3, GitHub, or Bitbucket</a:t>
-            </a:r>
-          </a:p>
-          <a:p>
-            <a:pPr marL="285750" indent="-285750">
-              <a:lnSpc>
-                <a:spcPct val="150000"/>
-              </a:lnSpc>
-              <a:buFont typeface="Arial" panose="020B0604020202020204" pitchFamily="34" charset="0"/>
-              <a:buChar char="•"/>
-            </a:pPr>
-            <a:r>
-              <a:rPr lang="en-US" dirty="0"/>
-              <a:t>Supports popular programming languages and build tools, and can be customized</a:t>
-            </a:r>
-          </a:p>
-          <a:p>
-            <a:pPr marL="285750" indent="-285750">
-              <a:lnSpc>
-                <a:spcPct val="150000"/>
-              </a:lnSpc>
-              <a:buFont typeface="Arial" panose="020B0604020202020204" pitchFamily="34" charset="0"/>
-              <a:buChar char="•"/>
-            </a:pPr>
-            <a:r>
-              <a:rPr lang="en-US" dirty="0"/>
-              <a:t>Run via AWS </a:t>
-            </a:r>
-            <a:r>
-              <a:rPr lang="en-US" dirty="0" err="1"/>
-              <a:t>CodeBuild</a:t>
-            </a:r>
-            <a:r>
-              <a:rPr lang="en-US" dirty="0"/>
-              <a:t> console, AWS CLI, AWS SDKs, or AWS </a:t>
-            </a:r>
-            <a:r>
-              <a:rPr lang="en-US" dirty="0" err="1"/>
-              <a:t>CodePipeline</a:t>
-            </a:r>
-            <a:endParaRPr lang="en-US" dirty="0"/>
-          </a:p>
-          <a:p>
-            <a:pPr marL="285750" indent="-285750">
-              <a:lnSpc>
-                <a:spcPct val="150000"/>
-              </a:lnSpc>
-              <a:buFont typeface="Arial" panose="020B0604020202020204" pitchFamily="34" charset="0"/>
-              <a:buChar char="•"/>
-            </a:pPr>
-            <a:r>
-              <a:rPr lang="en-US" dirty="0"/>
-              <a:t>Ability to view the overall status of the build, build phase details, and build logs</a:t>
-            </a:r>
-          </a:p>
-          <a:p>
-            <a:pPr marL="285750" indent="-285750">
-              <a:lnSpc>
-                <a:spcPct val="150000"/>
-              </a:lnSpc>
-              <a:buFont typeface="Arial" panose="020B0604020202020204" pitchFamily="34" charset="0"/>
-              <a:buChar char="•"/>
-            </a:pPr>
-            <a:r>
-              <a:rPr lang="en-US" dirty="0"/>
-              <a:t>Build specifications are written using a specific </a:t>
-            </a:r>
-            <a:r>
-              <a:rPr lang="en-US" dirty="0">
-                <a:hlinkClick r:id="rId3"/>
-              </a:rPr>
-              <a:t>syntax</a:t>
-            </a:r>
-            <a:r>
-              <a:rPr lang="en-US" dirty="0"/>
-              <a:t>, in a </a:t>
-            </a:r>
-            <a:r>
-              <a:rPr lang="en-US" dirty="0" err="1"/>
-              <a:t>yaml</a:t>
-            </a:r>
-            <a:r>
-              <a:rPr lang="en-US" dirty="0"/>
-              <a:t> format</a:t>
-            </a:r>
-          </a:p>
-          <a:p>
-            <a:pPr marL="285750" indent="-285750">
-              <a:lnSpc>
-                <a:spcPct val="150000"/>
-              </a:lnSpc>
-              <a:buFont typeface="Arial" panose="020B0604020202020204" pitchFamily="34" charset="0"/>
-              <a:buChar char="•"/>
-            </a:pPr>
-            <a:r>
-              <a:rPr lang="en-US" dirty="0">
-                <a:hlinkClick r:id="rId4"/>
-              </a:rPr>
-              <a:t>Pricing</a:t>
-            </a:r>
-            <a:r>
-              <a:rPr lang="en-US" dirty="0"/>
-              <a:t> is based on the number of build minutes, and there is a free tier option</a:t>
-            </a:r>
-          </a:p>
-          <a:p>
-            <a:pPr marL="285750" indent="-285750">
-              <a:lnSpc>
-                <a:spcPct val="150000"/>
-              </a:lnSpc>
-              <a:buFont typeface="Arial" panose="020B0604020202020204" pitchFamily="34" charset="0"/>
-              <a:buChar char="•"/>
-            </a:pPr>
-            <a:r>
-              <a:rPr lang="en-US" dirty="0"/>
-              <a:t>Team decided to use AWS </a:t>
-            </a:r>
-            <a:r>
-              <a:rPr lang="en-US" dirty="0" err="1"/>
-              <a:t>CodeBuild</a:t>
-            </a:r>
-            <a:r>
-              <a:rPr lang="en-US" dirty="0"/>
-              <a:t> because of the easy integration with AWS </a:t>
-            </a:r>
-            <a:r>
-              <a:rPr lang="en-US" dirty="0" err="1"/>
-              <a:t>CodePipeline</a:t>
-            </a:r>
-            <a:endParaRPr lang="en-US" dirty="0"/>
-          </a:p>
-          <a:p>
-            <a:pPr marL="285750" indent="-285750">
-              <a:lnSpc>
-                <a:spcPct val="150000"/>
-              </a:lnSpc>
-              <a:buFont typeface="Arial" panose="020B0604020202020204" pitchFamily="34" charset="0"/>
-              <a:buChar char="•"/>
-            </a:pPr>
-            <a:endParaRPr lang="en-US" dirty="0"/>
-          </a:p>
-          <a:p>
-            <a:pPr lvl="1">
-              <a:lnSpc>
-                <a:spcPct val="150000"/>
-              </a:lnSpc>
-            </a:pPr>
-            <a:r>
-              <a:rPr lang="en-US" dirty="0"/>
-              <a:t>(Source:  </a:t>
-            </a:r>
-            <a:r>
-              <a:rPr lang="fr-FR" dirty="0">
-                <a:hlinkClick r:id="rId5"/>
-              </a:rPr>
-              <a:t>https://docs.aws.amazon.com/codebuild/latest/userguide/welcome.html</a:t>
-            </a:r>
-            <a:r>
-              <a:rPr lang="fr-FR" dirty="0"/>
-              <a:t>)</a:t>
-            </a:r>
-            <a:endParaRPr lang="en-US" dirty="0"/>
-          </a:p>
-        </p:txBody>
-      </p:sp>
-    </p:spTree>
-    <p:extLst>
-      <p:ext uri="{BB962C8B-B14F-4D97-AF65-F5344CB8AC3E}">
-        <p14:creationId xmlns:p14="http://schemas.microsoft.com/office/powerpoint/2010/main" val="512997375"/>
-      </p:ext>
-    </p:extLst>
-  </p:cSld>
-  <p:clrMapOvr>
-    <a:masterClrMapping/>
-  </p:clrMapOvr>
-</p:sld>
-</file>
-
-<file path=ppt/slides/slide9.xml><?xml version="1.0" encoding="utf-8"?>
-<p:sld xmlns:a="http://schemas.openxmlformats.org/drawingml/2006/main" xmlns:r="http://schemas.openxmlformats.org/officeDocument/2006/relationships" xmlns:p="http://schemas.openxmlformats.org/presentationml/2006/main">
-  <p:cSld>
-    <p:spTree>
-      <p:nvGrpSpPr>
-        <p:cNvPr id="1" name=""/>
-        <p:cNvGrpSpPr/>
-        <p:nvPr/>
-      </p:nvGrpSpPr>
-      <p:grpSpPr>
-        <a:xfrm>
-          <a:off x="0" y="0"/>
-          <a:ext cx="0" cy="0"/>
-          <a:chOff x="0" y="0"/>
-          <a:chExt cx="0" cy="0"/>
-        </a:xfrm>
-      </p:grpSpPr>
-      <p:pic>
-        <p:nvPicPr>
-          <p:cNvPr id="4" name="Picture 3">
-            <a:extLst>
-              <a:ext uri="{FF2B5EF4-FFF2-40B4-BE49-F238E27FC236}">
-                <a16:creationId xmlns:a16="http://schemas.microsoft.com/office/drawing/2014/main" id="{05D957DA-20B5-425F-8107-70B33683D008}"/>
-              </a:ext>
-            </a:extLst>
-          </p:cNvPr>
-          <p:cNvPicPr>
-            <a:picLocks noChangeAspect="1"/>
-          </p:cNvPicPr>
-          <p:nvPr/>
-        </p:nvPicPr>
-        <p:blipFill>
-          <a:blip r:embed="rId2"/>
-          <a:stretch>
-            <a:fillRect/>
-          </a:stretch>
-        </p:blipFill>
-        <p:spPr>
-          <a:xfrm>
-            <a:off x="5549735" y="283944"/>
-            <a:ext cx="4381005" cy="3052506"/>
-          </a:xfrm>
-          <a:prstGeom prst="rect">
-            <a:avLst/>
-          </a:prstGeom>
-        </p:spPr>
-      </p:pic>
-      <p:pic>
-        <p:nvPicPr>
-          <p:cNvPr id="5" name="Picture 4">
-            <a:extLst>
-              <a:ext uri="{FF2B5EF4-FFF2-40B4-BE49-F238E27FC236}">
-                <a16:creationId xmlns:a16="http://schemas.microsoft.com/office/drawing/2014/main" id="{C163E8EA-8E86-4750-AAD1-89302E978901}"/>
-              </a:ext>
-            </a:extLst>
-          </p:cNvPr>
-          <p:cNvPicPr>
-            <a:picLocks noChangeAspect="1"/>
-          </p:cNvPicPr>
-          <p:nvPr/>
-        </p:nvPicPr>
-        <p:blipFill>
-          <a:blip r:embed="rId3"/>
-          <a:stretch>
-            <a:fillRect/>
-          </a:stretch>
-        </p:blipFill>
-        <p:spPr>
-          <a:xfrm>
-            <a:off x="2388919" y="3521551"/>
-            <a:ext cx="6915398" cy="2949481"/>
-          </a:xfrm>
-          <a:prstGeom prst="rect">
-            <a:avLst/>
-          </a:prstGeom>
-        </p:spPr>
-      </p:pic>
-      <p:pic>
-        <p:nvPicPr>
-          <p:cNvPr id="6" name="Picture 5">
-            <a:extLst>
-              <a:ext uri="{FF2B5EF4-FFF2-40B4-BE49-F238E27FC236}">
-                <a16:creationId xmlns:a16="http://schemas.microsoft.com/office/drawing/2014/main" id="{D7540EB3-365D-4B5D-AB41-6C01469E3CB0}"/>
-              </a:ext>
-            </a:extLst>
-          </p:cNvPr>
-          <p:cNvPicPr>
-            <a:picLocks noChangeAspect="1"/>
-          </p:cNvPicPr>
-          <p:nvPr/>
-        </p:nvPicPr>
-        <p:blipFill>
-          <a:blip r:embed="rId4"/>
-          <a:stretch>
-            <a:fillRect/>
-          </a:stretch>
-        </p:blipFill>
-        <p:spPr>
-          <a:xfrm>
-            <a:off x="2025654" y="1042988"/>
-            <a:ext cx="2819400" cy="1590675"/>
-          </a:xfrm>
-          <a:prstGeom prst="rect">
-            <a:avLst/>
-          </a:prstGeom>
-        </p:spPr>
-      </p:pic>
-    </p:spTree>
-    <p:extLst>
-      <p:ext uri="{BB962C8B-B14F-4D97-AF65-F5344CB8AC3E}">
-        <p14:creationId xmlns:p14="http://schemas.microsoft.com/office/powerpoint/2010/main" val="519025307"/>
       </p:ext>
     </p:extLst>
   </p:cSld>
@@ -11742,6 +12039,15 @@
 </file>
 
 <file path=customXml/item1.xml><?xml version="1.0" encoding="utf-8"?>
+<?mso-contentType ?>
+<FormTemplates xmlns="http://schemas.microsoft.com/sharepoint/v3/contenttype/forms">
+  <Display>DocumentLibraryForm</Display>
+  <Edit>DocumentLibraryForm</Edit>
+  <New>DocumentLibraryForm</New>
+</FormTemplates>
+</file>
+
+<file path=customXml/item2.xml><?xml version="1.0" encoding="utf-8"?>
 <ct:contentTypeSchema xmlns:ct="http://schemas.microsoft.com/office/2006/metadata/contentType" xmlns:ma="http://schemas.microsoft.com/office/2006/metadata/properties/metaAttributes" ct:_="" ma:_="" ma:contentTypeName="Document" ma:contentTypeID="0x01010079F111ED35F8CC479449609E8A0923A6" ma:contentTypeVersion="11" ma:contentTypeDescription="Create a new document." ma:contentTypeScope="" ma:versionID="96291512c1ee715ab617f4c07df79fc1">
   <xsd:schema xmlns:xsd="http://www.w3.org/2001/XMLSchema" xmlns:xs="http://www.w3.org/2001/XMLSchema" xmlns:p="http://schemas.microsoft.com/office/2006/metadata/properties" xmlns:ns2="71af3243-3dd4-4a8d-8c0d-dd76da1f02a5" xmlns:ns3="16c05727-aa75-4e4a-9b5f-8a80a1165891" targetNamespace="http://schemas.microsoft.com/office/2006/metadata/properties" ma:root="true" ma:fieldsID="8256c27c40ca5c40ce1cf6c44f0205df" ns2:_="" ns3:_="">
     <xsd:import namespace="71af3243-3dd4-4a8d-8c0d-dd76da1f02a5"/>
@@ -11952,15 +12258,6 @@
 </ct:contentTypeSchema>
 </file>
 
-<file path=customXml/item2.xml><?xml version="1.0" encoding="utf-8"?>
-<?mso-contentType ?>
-<FormTemplates xmlns="http://schemas.microsoft.com/sharepoint/v3/contenttype/forms">
-  <Display>DocumentLibraryForm</Display>
-  <Edit>DocumentLibraryForm</Edit>
-  <New>DocumentLibraryForm</New>
-</FormTemplates>
-</file>
-
 <file path=customXml/item3.xml><?xml version="1.0" encoding="utf-8"?>
 <p:properties xmlns:p="http://schemas.microsoft.com/office/2006/metadata/properties" xmlns:xsi="http://www.w3.org/2001/XMLSchema-instance" xmlns:pc="http://schemas.microsoft.com/office/infopath/2007/PartnerControls">
   <documentManagement>
@@ -11970,6 +12267,14 @@
 </file>
 
 <file path=customXml/itemProps1.xml><?xml version="1.0" encoding="utf-8"?>
+<ds:datastoreItem xmlns:ds="http://schemas.openxmlformats.org/officeDocument/2006/customXml" ds:itemID="{5CA875DA-F9FD-4F83-A049-3B1027B542DE}">
+  <ds:schemaRefs>
+    <ds:schemaRef ds:uri="http://schemas.microsoft.com/sharepoint/v3/contenttype/forms"/>
+  </ds:schemaRefs>
+</ds:datastoreItem>
+</file>
+
+<file path=customXml/itemProps2.xml><?xml version="1.0" encoding="utf-8"?>
 <ds:datastoreItem xmlns:ds="http://schemas.openxmlformats.org/officeDocument/2006/customXml" ds:itemID="{B2AB02E3-5ADF-4BF0-9C1B-35CDF3FE95B0}">
   <ds:schemaRefs>
     <ds:schemaRef ds:uri="http://schemas.microsoft.com/office/2006/metadata/contentType"/>
@@ -11984,14 +12289,6 @@
     <ds:schemaRef ds:uri="http://purl.org/dc/elements/1.1/"/>
     <ds:schemaRef ds:uri="http://purl.org/dc/terms/"/>
     <ds:schemaRef ds:uri="http://schemas.microsoft.com/internal/obd"/>
-  </ds:schemaRefs>
-</ds:datastoreItem>
-</file>
-
-<file path=customXml/itemProps2.xml><?xml version="1.0" encoding="utf-8"?>
-<ds:datastoreItem xmlns:ds="http://schemas.openxmlformats.org/officeDocument/2006/customXml" ds:itemID="{5CA875DA-F9FD-4F83-A049-3B1027B542DE}">
-  <ds:schemaRefs>
-    <ds:schemaRef ds:uri="http://schemas.microsoft.com/sharepoint/v3/contenttype/forms"/>
   </ds:schemaRefs>
 </ds:datastoreItem>
 </file>

</xml_diff>

<commit_message>
updated trello and github pages
</commit_message>
<xml_diff>
--- a/documentation/Demonstrations/Connacht_University_TeamDC.pptx
+++ b/documentation/Demonstrations/Connacht_University_TeamDC.pptx
@@ -14687,17 +14687,19 @@
       </p:sp>
       <p:pic>
         <p:nvPicPr>
-          <p:cNvPr id="6" name="Picture 5" descr="A screenshot of a social media post&#10;&#10;Description automatically generated">
-            <a:extLst>
-              <a:ext uri="{FF2B5EF4-FFF2-40B4-BE49-F238E27FC236}">
-                <a16:creationId xmlns:a16="http://schemas.microsoft.com/office/drawing/2014/main" id="{F7E5E7B0-38FF-4B8A-949A-DF3F8ECE803C}"/>
+          <p:cNvPr id="10" name="Content Placeholder 4" descr="A screenshot of a cell phone&#10;&#10;Description automatically generated">
+            <a:extLst>
+              <a:ext uri="{FF2B5EF4-FFF2-40B4-BE49-F238E27FC236}">
+                <a16:creationId xmlns:a16="http://schemas.microsoft.com/office/drawing/2014/main" id="{4E66B466-18BE-40F3-8A35-7001ED79E724}"/>
               </a:ext>
             </a:extLst>
           </p:cNvPr>
           <p:cNvPicPr>
-            <a:picLocks noChangeAspect="1"/>
+            <a:picLocks noGrp="1" noChangeAspect="1"/>
           </p:cNvPicPr>
-          <p:nvPr/>
+          <p:nvPr>
+            <p:ph idx="1"/>
+          </p:nvPr>
         </p:nvPicPr>
         <p:blipFill>
           <a:blip r:embed="rId3">
@@ -14713,29 +14715,40 @@
         </p:blipFill>
         <p:spPr>
           <a:xfrm>
-            <a:off x="353259" y="2205038"/>
-            <a:ext cx="5657015" cy="4246933"/>
+            <a:off x="7364310" y="3181177"/>
+            <a:ext cx="3639510" cy="3385322"/>
           </a:xfrm>
-          <a:prstGeom prst="rect">
-            <a:avLst/>
+          <a:prstGeom prst="roundRect">
+            <a:avLst>
+              <a:gd name="adj" fmla="val 8594"/>
+            </a:avLst>
           </a:prstGeom>
+          <a:solidFill>
+            <a:srgbClr val="FFFFFF">
+              <a:shade val="85000"/>
+            </a:srgbClr>
+          </a:solidFill>
+          <a:ln>
+            <a:noFill/>
+          </a:ln>
+          <a:effectLst>
+            <a:reflection blurRad="12700" stA="38000" endPos="28000" dist="5000" dir="5400000" sy="-100000" algn="bl" rotWithShape="0"/>
+          </a:effectLst>
         </p:spPr>
       </p:pic>
       <p:pic>
         <p:nvPicPr>
-          <p:cNvPr id="7" name="Content Placeholder 4" descr="A screenshot of a cell phone&#10;&#10;Description automatically generated">
-            <a:extLst>
-              <a:ext uri="{FF2B5EF4-FFF2-40B4-BE49-F238E27FC236}">
-                <a16:creationId xmlns:a16="http://schemas.microsoft.com/office/drawing/2014/main" id="{D63F2D1F-9BF3-4BB5-85F9-127C38152ED8}"/>
+          <p:cNvPr id="11" name="Picture 10" descr="A screenshot of a social media post&#10;&#10;Description automatically generated">
+            <a:extLst>
+              <a:ext uri="{FF2B5EF4-FFF2-40B4-BE49-F238E27FC236}">
+                <a16:creationId xmlns:a16="http://schemas.microsoft.com/office/drawing/2014/main" id="{5EAF2BEC-9BDE-401A-A7A2-5DCD5024A3C6}"/>
               </a:ext>
             </a:extLst>
           </p:cNvPr>
           <p:cNvPicPr>
-            <a:picLocks noGrp="1" noChangeAspect="1"/>
+            <a:picLocks noChangeAspect="1"/>
           </p:cNvPicPr>
-          <p:nvPr>
-            <p:ph idx="1"/>
-          </p:nvPr>
+          <p:nvPr/>
         </p:nvPicPr>
         <p:blipFill>
           <a:blip r:embed="rId4">
@@ -14751,11 +14764,154 @@
         </p:blipFill>
         <p:spPr>
           <a:xfrm>
-            <a:off x="6604001" y="2238454"/>
-            <a:ext cx="5234740" cy="4213517"/>
+            <a:off x="410410" y="1690688"/>
+            <a:ext cx="4417282" cy="3316219"/>
           </a:xfrm>
+          <a:prstGeom prst="roundRect">
+            <a:avLst>
+              <a:gd name="adj" fmla="val 8594"/>
+            </a:avLst>
+          </a:prstGeom>
+          <a:solidFill>
+            <a:srgbClr val="FFFFFF">
+              <a:shade val="85000"/>
+            </a:srgbClr>
+          </a:solidFill>
+          <a:ln>
+            <a:noFill/>
+          </a:ln>
+          <a:effectLst>
+            <a:reflection blurRad="12700" stA="38000" endPos="28000" dist="5000" dir="5400000" sy="-100000" algn="bl" rotWithShape="0"/>
+          </a:effectLst>
         </p:spPr>
       </p:pic>
+      <p:sp>
+        <p:nvSpPr>
+          <p:cNvPr id="12" name="TextBox 11">
+            <a:extLst>
+              <a:ext uri="{FF2B5EF4-FFF2-40B4-BE49-F238E27FC236}">
+                <a16:creationId xmlns:a16="http://schemas.microsoft.com/office/drawing/2014/main" id="{EFAEF38F-7387-458E-8FE0-D073ABF7803E}"/>
+              </a:ext>
+            </a:extLst>
+          </p:cNvPr>
+          <p:cNvSpPr txBox="1"/>
+          <p:nvPr/>
+        </p:nvSpPr>
+        <p:spPr>
+          <a:xfrm>
+            <a:off x="410410" y="5352393"/>
+            <a:ext cx="5168462" cy="1200329"/>
+          </a:xfrm>
+          <a:prstGeom prst="rect">
+            <a:avLst/>
+          </a:prstGeom>
+          <a:noFill/>
+        </p:spPr>
+        <p:txBody>
+          <a:bodyPr wrap="square" rtlCol="0">
+            <a:spAutoFit/>
+          </a:bodyPr>
+          <a:lstStyle/>
+          <a:p>
+            <a:pPr marL="285750" indent="-285750">
+              <a:buFont typeface="Arial" panose="020B0604020202020204" pitchFamily="34" charset="0"/>
+              <a:buChar char="•"/>
+            </a:pPr>
+            <a:r>
+              <a:rPr lang="en-US" dirty="0"/>
+              <a:t>Kanban Style through Trello</a:t>
+            </a:r>
+          </a:p>
+          <a:p>
+            <a:pPr marL="285750" indent="-285750">
+              <a:buFont typeface="Arial" panose="020B0604020202020204" pitchFamily="34" charset="0"/>
+              <a:buChar char="•"/>
+            </a:pPr>
+            <a:r>
+              <a:rPr lang="en-US" dirty="0"/>
+              <a:t>Backlog, In-progress, Waiting for Acceptance and Accepted</a:t>
+            </a:r>
+          </a:p>
+          <a:p>
+            <a:pPr marL="285750" indent="-285750">
+              <a:buFont typeface="Arial" panose="020B0604020202020204" pitchFamily="34" charset="0"/>
+              <a:buChar char="•"/>
+            </a:pPr>
+            <a:endParaRPr lang="en-US" dirty="0"/>
+          </a:p>
+        </p:txBody>
+      </p:sp>
+      <p:sp>
+        <p:nvSpPr>
+          <p:cNvPr id="13" name="TextBox 12">
+            <a:extLst>
+              <a:ext uri="{FF2B5EF4-FFF2-40B4-BE49-F238E27FC236}">
+                <a16:creationId xmlns:a16="http://schemas.microsoft.com/office/drawing/2014/main" id="{665A4D58-3DD2-483B-9B6D-2FFF8BC8E4BF}"/>
+              </a:ext>
+            </a:extLst>
+          </p:cNvPr>
+          <p:cNvSpPr txBox="1"/>
+          <p:nvPr/>
+        </p:nvSpPr>
+        <p:spPr>
+          <a:xfrm>
+            <a:off x="6879906" y="2111800"/>
+            <a:ext cx="5168462" cy="1200329"/>
+          </a:xfrm>
+          <a:prstGeom prst="rect">
+            <a:avLst/>
+          </a:prstGeom>
+          <a:noFill/>
+        </p:spPr>
+        <p:txBody>
+          <a:bodyPr wrap="square" rtlCol="0">
+            <a:spAutoFit/>
+          </a:bodyPr>
+          <a:lstStyle/>
+          <a:p>
+            <a:pPr marL="285750" indent="-285750">
+              <a:buFont typeface="Arial" panose="020B0604020202020204" pitchFamily="34" charset="0"/>
+              <a:buChar char="•"/>
+            </a:pPr>
+            <a:r>
+              <a:rPr lang="en-US" dirty="0"/>
+              <a:t>User Stories captured in color-coded cards</a:t>
+            </a:r>
+          </a:p>
+          <a:p>
+            <a:pPr marL="285750" indent="-285750">
+              <a:buFont typeface="Arial" panose="020B0604020202020204" pitchFamily="34" charset="0"/>
+              <a:buChar char="•"/>
+            </a:pPr>
+            <a:r>
+              <a:rPr lang="en-US" dirty="0"/>
+              <a:t>Labeled with related Sprint</a:t>
+            </a:r>
+          </a:p>
+          <a:p>
+            <a:pPr marL="285750" indent="-285750">
+              <a:buFont typeface="Arial" panose="020B0604020202020204" pitchFamily="34" charset="0"/>
+              <a:buChar char="•"/>
+            </a:pPr>
+            <a:r>
+              <a:rPr lang="en-US" dirty="0"/>
+              <a:t>Includes Story Points, Acceptance Criteria, </a:t>
+            </a:r>
+            <a:r>
+              <a:rPr lang="en-US" dirty="0" err="1"/>
+              <a:t>etc</a:t>
+            </a:r>
+            <a:endParaRPr lang="en-US" dirty="0"/>
+          </a:p>
+          <a:p>
+            <a:pPr marL="285750" indent="-285750">
+              <a:buFont typeface="Arial" panose="020B0604020202020204" pitchFamily="34" charset="0"/>
+              <a:buChar char="•"/>
+            </a:pPr>
+            <a:endParaRPr lang="en-US" dirty="0"/>
+          </a:p>
+        </p:txBody>
+      </p:sp>
     </p:spTree>
     <p:extLst>
       <p:ext uri="{BB962C8B-B14F-4D97-AF65-F5344CB8AC3E}">
@@ -15069,10 +15225,10 @@
       </p:sp>
       <p:pic>
         <p:nvPicPr>
-          <p:cNvPr id="6" name="Picture 5" descr="A screenshot of a cell phone&#10;&#10;Description automatically generated">
-            <a:extLst>
-              <a:ext uri="{FF2B5EF4-FFF2-40B4-BE49-F238E27FC236}">
-                <a16:creationId xmlns:a16="http://schemas.microsoft.com/office/drawing/2014/main" id="{2494C468-CB85-4FAD-8A0B-ABEFB3D96E78}"/>
+          <p:cNvPr id="12" name="Content Placeholder 4" descr="A screenshot of a cell phone&#10;&#10;Description automatically generated">
+            <a:extLst>
+              <a:ext uri="{FF2B5EF4-FFF2-40B4-BE49-F238E27FC236}">
+                <a16:creationId xmlns:a16="http://schemas.microsoft.com/office/drawing/2014/main" id="{B8671242-A02E-491F-89B0-06946CBEE489}"/>
               </a:ext>
             </a:extLst>
           </p:cNvPr>
@@ -15095,20 +15251,30 @@
         </p:blipFill>
         <p:spPr>
           <a:xfrm>
-            <a:off x="3372462" y="1909811"/>
-            <a:ext cx="2244373" cy="2525486"/>
+            <a:off x="189264" y="3537784"/>
+            <a:ext cx="4521206" cy="2104850"/>
           </a:xfrm>
           <a:prstGeom prst="rect">
             <a:avLst/>
           </a:prstGeom>
+          <a:ln>
+            <a:noFill/>
+          </a:ln>
+          <a:effectLst>
+            <a:outerShdw blurRad="292100" dist="139700" dir="2700000" algn="tl" rotWithShape="0">
+              <a:srgbClr val="333333">
+                <a:alpha val="65000"/>
+              </a:srgbClr>
+            </a:outerShdw>
+          </a:effectLst>
         </p:spPr>
       </p:pic>
       <p:pic>
         <p:nvPicPr>
-          <p:cNvPr id="7" name="Picture 6" descr="A screenshot of a social media post&#10;&#10;Description automatically generated">
-            <a:extLst>
-              <a:ext uri="{FF2B5EF4-FFF2-40B4-BE49-F238E27FC236}">
-                <a16:creationId xmlns:a16="http://schemas.microsoft.com/office/drawing/2014/main" id="{08A6834D-41B8-4E9A-9149-6A8707440232}"/>
+          <p:cNvPr id="13" name="Picture 12" descr="A screenshot of a social media post&#10;&#10;Description automatically generated">
+            <a:extLst>
+              <a:ext uri="{FF2B5EF4-FFF2-40B4-BE49-F238E27FC236}">
+                <a16:creationId xmlns:a16="http://schemas.microsoft.com/office/drawing/2014/main" id="{CD618D52-A6C2-4869-837F-151DA9BDAB12}"/>
               </a:ext>
             </a:extLst>
           </p:cNvPr>
@@ -15131,29 +15297,37 @@
         </p:blipFill>
         <p:spPr>
           <a:xfrm>
-            <a:off x="5964138" y="2063116"/>
-            <a:ext cx="5989125" cy="3469429"/>
+            <a:off x="4955149" y="3982566"/>
+            <a:ext cx="4157450" cy="2408361"/>
           </a:xfrm>
           <a:prstGeom prst="rect">
             <a:avLst/>
           </a:prstGeom>
+          <a:ln>
+            <a:noFill/>
+          </a:ln>
+          <a:effectLst>
+            <a:outerShdw blurRad="292100" dist="139700" dir="2700000" algn="tl" rotWithShape="0">
+              <a:srgbClr val="333333">
+                <a:alpha val="65000"/>
+              </a:srgbClr>
+            </a:outerShdw>
+          </a:effectLst>
         </p:spPr>
       </p:pic>
       <p:pic>
         <p:nvPicPr>
-          <p:cNvPr id="8" name="Content Placeholder 4" descr="A screenshot of a cell phone&#10;&#10;Description automatically generated">
-            <a:extLst>
-              <a:ext uri="{FF2B5EF4-FFF2-40B4-BE49-F238E27FC236}">
-                <a16:creationId xmlns:a16="http://schemas.microsoft.com/office/drawing/2014/main" id="{E6E56C18-8DA2-46F3-96DF-E0363256A8A2}"/>
+          <p:cNvPr id="14" name="Picture 13" descr="A screenshot of a cell phone&#10;&#10;Description automatically generated">
+            <a:extLst>
+              <a:ext uri="{FF2B5EF4-FFF2-40B4-BE49-F238E27FC236}">
+                <a16:creationId xmlns:a16="http://schemas.microsoft.com/office/drawing/2014/main" id="{A020CB67-F55B-4AD0-BA5F-0D1D29E2E84F}"/>
               </a:ext>
             </a:extLst>
           </p:cNvPr>
           <p:cNvPicPr>
-            <a:picLocks noGrp="1" noChangeAspect="1"/>
+            <a:picLocks noChangeAspect="1"/>
           </p:cNvPicPr>
-          <p:nvPr>
-            <p:ph idx="1"/>
-          </p:nvPr>
+          <p:nvPr/>
         </p:nvPicPr>
         <p:blipFill>
           <a:blip r:embed="rId5">
@@ -15169,17 +15343,30 @@
         </p:blipFill>
         <p:spPr>
           <a:xfrm>
-            <a:off x="640458" y="4588602"/>
-            <a:ext cx="5084943" cy="2367298"/>
+            <a:off x="9530113" y="4110841"/>
+            <a:ext cx="2244373" cy="2525486"/>
           </a:xfrm>
+          <a:prstGeom prst="rect">
+            <a:avLst/>
+          </a:prstGeom>
+          <a:ln>
+            <a:noFill/>
+          </a:ln>
+          <a:effectLst>
+            <a:outerShdw blurRad="292100" dist="139700" dir="2700000" algn="tl" rotWithShape="0">
+              <a:srgbClr val="333333">
+                <a:alpha val="65000"/>
+              </a:srgbClr>
+            </a:outerShdw>
+          </a:effectLst>
         </p:spPr>
       </p:pic>
       <p:sp>
         <p:nvSpPr>
-          <p:cNvPr id="3" name="TextBox 2">
-            <a:extLst>
-              <a:ext uri="{FF2B5EF4-FFF2-40B4-BE49-F238E27FC236}">
-                <a16:creationId xmlns:a16="http://schemas.microsoft.com/office/drawing/2014/main" id="{884CCC91-5C01-43E1-949E-61DA5809EACD}"/>
+          <p:cNvPr id="15" name="TextBox 14">
+            <a:extLst>
+              <a:ext uri="{FF2B5EF4-FFF2-40B4-BE49-F238E27FC236}">
+                <a16:creationId xmlns:a16="http://schemas.microsoft.com/office/drawing/2014/main" id="{A77DB695-897E-4E45-976F-1E13047902A7}"/>
               </a:ext>
             </a:extLst>
           </p:cNvPr>
@@ -15188,8 +15375,8 @@
         </p:nvSpPr>
         <p:spPr>
           <a:xfrm>
-            <a:off x="314325" y="2063116"/>
-            <a:ext cx="3058137" cy="646331"/>
+            <a:off x="606778" y="2085359"/>
+            <a:ext cx="5865142" cy="1477328"/>
           </a:xfrm>
           <a:prstGeom prst="rect">
             <a:avLst/>
@@ -15202,10 +15389,60 @@
           </a:bodyPr>
           <a:lstStyle/>
           <a:p>
+            <a:pPr marL="285750" indent="-285750">
+              <a:buFont typeface="Arial" panose="020B0604020202020204" pitchFamily="34" charset="0"/>
+              <a:buChar char="•"/>
+            </a:pPr>
+            <a:r>
+              <a:rPr lang="en-US" i="1" dirty="0"/>
+              <a:t>Documentation</a:t>
+            </a:r>
             <a:r>
               <a:rPr lang="en-US" dirty="0"/>
-              <a:t>GitHub is the repository used for code and documentation.</a:t>
-            </a:r>
+              <a:t> and </a:t>
+            </a:r>
+            <a:r>
+              <a:rPr lang="en-US" i="1" dirty="0"/>
+              <a:t>Master</a:t>
+            </a:r>
+            <a:r>
+              <a:rPr lang="en-US" dirty="0"/>
+              <a:t> persistent branches</a:t>
+            </a:r>
+          </a:p>
+          <a:p>
+            <a:pPr marL="285750" indent="-285750">
+              <a:buFont typeface="Arial" panose="020B0604020202020204" pitchFamily="34" charset="0"/>
+              <a:buChar char="•"/>
+            </a:pPr>
+            <a:r>
+              <a:rPr lang="en-US" dirty="0"/>
+              <a:t>Branching strategy outlined</a:t>
+            </a:r>
+          </a:p>
+          <a:p>
+            <a:pPr marL="285750" indent="-285750">
+              <a:buFont typeface="Arial" panose="020B0604020202020204" pitchFamily="34" charset="0"/>
+              <a:buChar char="•"/>
+            </a:pPr>
+            <a:r>
+              <a:rPr lang="en-US" dirty="0"/>
+              <a:t>Pull Requests, Code Reviews, and Merging to master</a:t>
+            </a:r>
+          </a:p>
+          <a:p>
+            <a:pPr marL="285750" indent="-285750">
+              <a:buFont typeface="Arial" panose="020B0604020202020204" pitchFamily="34" charset="0"/>
+              <a:buChar char="•"/>
+            </a:pPr>
+            <a:endParaRPr lang="en-US" dirty="0"/>
+          </a:p>
+          <a:p>
+            <a:pPr marL="285750" indent="-285750">
+              <a:buFont typeface="Arial" panose="020B0604020202020204" pitchFamily="34" charset="0"/>
+              <a:buChar char="•"/>
+            </a:pPr>
+            <a:endParaRPr lang="en-US" dirty="0"/>
           </a:p>
         </p:txBody>
       </p:sp>
@@ -17048,6 +17285,15 @@
 </file>
 
 <file path=customXml/item2.xml><?xml version="1.0" encoding="utf-8"?>
+<?mso-contentType ?>
+<FormTemplates xmlns="http://schemas.microsoft.com/sharepoint/v3/contenttype/forms">
+  <Display>DocumentLibraryForm</Display>
+  <Edit>DocumentLibraryForm</Edit>
+  <New>DocumentLibraryForm</New>
+</FormTemplates>
+</file>
+
+<file path=customXml/item3.xml><?xml version="1.0" encoding="utf-8"?>
 <ct:contentTypeSchema xmlns:ct="http://schemas.microsoft.com/office/2006/metadata/contentType" xmlns:ma="http://schemas.microsoft.com/office/2006/metadata/properties/metaAttributes" ct:_="" ma:_="" ma:contentTypeName="Document" ma:contentTypeID="0x01010079F111ED35F8CC479449609E8A0923A6" ma:contentTypeVersion="11" ma:contentTypeDescription="Create a new document." ma:contentTypeScope="" ma:versionID="96291512c1ee715ab617f4c07df79fc1">
   <xsd:schema xmlns:xsd="http://www.w3.org/2001/XMLSchema" xmlns:xs="http://www.w3.org/2001/XMLSchema" xmlns:p="http://schemas.microsoft.com/office/2006/metadata/properties" xmlns:ns2="71af3243-3dd4-4a8d-8c0d-dd76da1f02a5" xmlns:ns3="16c05727-aa75-4e4a-9b5f-8a80a1165891" targetNamespace="http://schemas.microsoft.com/office/2006/metadata/properties" ma:root="true" ma:fieldsID="8256c27c40ca5c40ce1cf6c44f0205df" ns2:_="" ns3:_="">
     <xsd:import namespace="71af3243-3dd4-4a8d-8c0d-dd76da1f02a5"/>
@@ -17258,15 +17504,6 @@
 </ct:contentTypeSchema>
 </file>
 
-<file path=customXml/item3.xml><?xml version="1.0" encoding="utf-8"?>
-<?mso-contentType ?>
-<FormTemplates xmlns="http://schemas.microsoft.com/sharepoint/v3/contenttype/forms">
-  <Display>DocumentLibraryForm</Display>
-  <Edit>DocumentLibraryForm</Edit>
-  <New>DocumentLibraryForm</New>
-</FormTemplates>
-</file>
-
 <file path=customXml/itemProps1.xml><?xml version="1.0" encoding="utf-8"?>
 <ds:datastoreItem xmlns:ds="http://schemas.openxmlformats.org/officeDocument/2006/customXml" ds:itemID="{03C7D9E6-B0D9-433E-BD46-EB60F64F4DA8}">
   <ds:schemaRefs>
@@ -17285,6 +17522,14 @@
 </file>
 
 <file path=customXml/itemProps2.xml><?xml version="1.0" encoding="utf-8"?>
+<ds:datastoreItem xmlns:ds="http://schemas.openxmlformats.org/officeDocument/2006/customXml" ds:itemID="{5CA875DA-F9FD-4F83-A049-3B1027B542DE}">
+  <ds:schemaRefs>
+    <ds:schemaRef ds:uri="http://schemas.microsoft.com/sharepoint/v3/contenttype/forms"/>
+  </ds:schemaRefs>
+</ds:datastoreItem>
+</file>
+
+<file path=customXml/itemProps3.xml><?xml version="1.0" encoding="utf-8"?>
 <ds:datastoreItem xmlns:ds="http://schemas.openxmlformats.org/officeDocument/2006/customXml" ds:itemID="{B2AB02E3-5ADF-4BF0-9C1B-35CDF3FE95B0}">
   <ds:schemaRefs>
     <ds:schemaRef ds:uri="http://schemas.microsoft.com/office/2006/metadata/contentType"/>
@@ -17301,12 +17546,4 @@
     <ds:schemaRef ds:uri="http://schemas.microsoft.com/internal/obd"/>
   </ds:schemaRefs>
 </ds:datastoreItem>
-</file>
-
-<file path=customXml/itemProps3.xml><?xml version="1.0" encoding="utf-8"?>
-<ds:datastoreItem xmlns:ds="http://schemas.openxmlformats.org/officeDocument/2006/customXml" ds:itemID="{5CA875DA-F9FD-4F83-A049-3B1027B542DE}">
-  <ds:schemaRefs>
-    <ds:schemaRef ds:uri="http://schemas.microsoft.com/sharepoint/v3/contenttype/forms"/>
-  </ds:schemaRefs>
-</ds:datastoreItem>
 </file>
</xml_diff>

<commit_message>
Added Change Management Slide
</commit_message>
<xml_diff>
--- a/documentation/Demonstrations/Connacht_University_TeamDC.pptx
+++ b/documentation/Demonstrations/Connacht_University_TeamDC.pptx
@@ -5,10 +5,10 @@
     <p:sldMasterId id="2147483648" r:id="rId4"/>
   </p:sldMasterIdLst>
   <p:notesMasterIdLst>
-    <p:notesMasterId r:id="rId24"/>
+    <p:notesMasterId r:id="rId25"/>
   </p:notesMasterIdLst>
   <p:handoutMasterIdLst>
-    <p:handoutMasterId r:id="rId25"/>
+    <p:handoutMasterId r:id="rId26"/>
   </p:handoutMasterIdLst>
   <p:sldIdLst>
     <p:sldId id="256" r:id="rId5"/>
@@ -30,6 +30,7 @@
     <p:sldId id="264" r:id="rId21"/>
     <p:sldId id="284" r:id="rId22"/>
     <p:sldId id="275" r:id="rId23"/>
+    <p:sldId id="285" r:id="rId24"/>
   </p:sldIdLst>
   <p:sldSz cx="12192000" cy="6858000"/>
   <p:notesSz cx="6858000" cy="9144000"/>
@@ -2550,6 +2551,261 @@
     <p:extLst>
       <p:ext uri="{BB962C8B-B14F-4D97-AF65-F5344CB8AC3E}">
         <p14:creationId xmlns:p14="http://schemas.microsoft.com/office/powerpoint/2010/main" val="2026532120"/>
+      </p:ext>
+    </p:extLst>
+  </p:cSld>
+  <p:clrMapOvr>
+    <a:masterClrMapping/>
+  </p:clrMapOvr>
+</p:notes>
+</file>
+
+<file path=ppt/notesSlides/notesSlide18.xml><?xml version="1.0" encoding="utf-8"?>
+<p:notes xmlns:a="http://schemas.openxmlformats.org/drawingml/2006/main" xmlns:r="http://schemas.openxmlformats.org/officeDocument/2006/relationships" xmlns:p="http://schemas.openxmlformats.org/presentationml/2006/main">
+  <p:cSld>
+    <p:spTree>
+      <p:nvGrpSpPr>
+        <p:cNvPr id="1" name=""/>
+        <p:cNvGrpSpPr/>
+        <p:nvPr/>
+      </p:nvGrpSpPr>
+      <p:grpSpPr>
+        <a:xfrm>
+          <a:off x="0" y="0"/>
+          <a:ext cx="0" cy="0"/>
+          <a:chOff x="0" y="0"/>
+          <a:chExt cx="0" cy="0"/>
+        </a:xfrm>
+      </p:grpSpPr>
+      <p:sp>
+        <p:nvSpPr>
+          <p:cNvPr id="2" name="Slide Image Placeholder 1"/>
+          <p:cNvSpPr>
+            <a:spLocks noGrp="1" noRot="1" noChangeAspect="1"/>
+          </p:cNvSpPr>
+          <p:nvPr>
+            <p:ph type="sldImg"/>
+          </p:nvPr>
+        </p:nvSpPr>
+        <p:spPr/>
+      </p:sp>
+      <p:sp>
+        <p:nvSpPr>
+          <p:cNvPr id="3" name="Notes Placeholder 2"/>
+          <p:cNvSpPr>
+            <a:spLocks noGrp="1"/>
+          </p:cNvSpPr>
+          <p:nvPr>
+            <p:ph type="body" idx="1"/>
+          </p:nvPr>
+        </p:nvSpPr>
+        <p:spPr/>
+        <p:txBody>
+          <a:bodyPr/>
+          <a:lstStyle/>
+          <a:p>
+            <a:r>
+              <a:rPr lang="en-US" i="0" dirty="0">
+                <a:latin typeface="Segoe UI" panose="020B0502040204020203" pitchFamily="34" charset="0"/>
+                <a:cs typeface="Segoe UI" panose="020B0502040204020203" pitchFamily="34" charset="0"/>
+              </a:rPr>
+              <a:t>Once you find your sources, you will want to evaluate your sources using the following questions: </a:t>
+            </a:r>
+          </a:p>
+          <a:p>
+            <a:endParaRPr lang="en-US" i="0" dirty="0">
+              <a:latin typeface="Segoe UI" panose="020B0502040204020203" pitchFamily="34" charset="0"/>
+              <a:cs typeface="Segoe UI" panose="020B0502040204020203" pitchFamily="34" charset="0"/>
+            </a:endParaRPr>
+          </a:p>
+          <a:p>
+            <a:r>
+              <a:rPr lang="en-US" b="1" i="0" dirty="0">
+                <a:latin typeface="Segoe UI" panose="020B0502040204020203" pitchFamily="34" charset="0"/>
+                <a:cs typeface="Segoe UI" panose="020B0502040204020203" pitchFamily="34" charset="0"/>
+              </a:rPr>
+              <a:t>Author: </a:t>
+            </a:r>
+          </a:p>
+          <a:p>
+            <a:pPr marL="171450" indent="-171450">
+              <a:buFont typeface="Arial" panose="020B0604020202020204" pitchFamily="34" charset="0"/>
+              <a:buChar char="•"/>
+            </a:pPr>
+            <a:r>
+              <a:rPr lang="en-US" i="0" dirty="0">
+                <a:latin typeface="Segoe UI" panose="020B0502040204020203" pitchFamily="34" charset="0"/>
+                <a:cs typeface="Segoe UI" panose="020B0502040204020203" pitchFamily="34" charset="0"/>
+              </a:rPr>
+              <a:t>Who is the author?</a:t>
+            </a:r>
+          </a:p>
+          <a:p>
+            <a:pPr marL="171450" indent="-171450">
+              <a:buFont typeface="Arial" panose="020B0604020202020204" pitchFamily="34" charset="0"/>
+              <a:buChar char="•"/>
+            </a:pPr>
+            <a:r>
+              <a:rPr lang="en-US" i="0" dirty="0">
+                <a:latin typeface="Segoe UI" panose="020B0502040204020203" pitchFamily="34" charset="0"/>
+                <a:cs typeface="Segoe UI" panose="020B0502040204020203" pitchFamily="34" charset="0"/>
+              </a:rPr>
+              <a:t>Why should I believe what he or she has to say on the topic?</a:t>
+            </a:r>
+          </a:p>
+          <a:p>
+            <a:pPr marL="171450" indent="-171450">
+              <a:buFont typeface="Arial" panose="020B0604020202020204" pitchFamily="34" charset="0"/>
+              <a:buChar char="•"/>
+            </a:pPr>
+            <a:r>
+              <a:rPr lang="en-US" i="0" dirty="0">
+                <a:latin typeface="Segoe UI" panose="020B0502040204020203" pitchFamily="34" charset="0"/>
+                <a:cs typeface="Segoe UI" panose="020B0502040204020203" pitchFamily="34" charset="0"/>
+              </a:rPr>
+              <a:t>Is the author seen as an expert on the topic? How do you know?</a:t>
+            </a:r>
+          </a:p>
+          <a:p>
+            <a:pPr marL="171450" indent="-171450">
+              <a:buFont typeface="Arial" panose="020B0604020202020204" pitchFamily="34" charset="0"/>
+              <a:buChar char="•"/>
+            </a:pPr>
+            <a:endParaRPr lang="en-US" i="0" dirty="0">
+              <a:latin typeface="Segoe UI" panose="020B0502040204020203" pitchFamily="34" charset="0"/>
+              <a:cs typeface="Segoe UI" panose="020B0502040204020203" pitchFamily="34" charset="0"/>
+            </a:endParaRPr>
+          </a:p>
+          <a:p>
+            <a:pPr marL="0" indent="0">
+              <a:buFont typeface="Arial" panose="020B0604020202020204" pitchFamily="34" charset="0"/>
+              <a:buNone/>
+            </a:pPr>
+            <a:r>
+              <a:rPr lang="en-US" b="1" i="0" dirty="0">
+                <a:latin typeface="Segoe UI" panose="020B0502040204020203" pitchFamily="34" charset="0"/>
+                <a:cs typeface="Segoe UI" panose="020B0502040204020203" pitchFamily="34" charset="0"/>
+              </a:rPr>
+              <a:t>Current: </a:t>
+            </a:r>
+          </a:p>
+          <a:p>
+            <a:pPr marL="171450" indent="-171450">
+              <a:buFont typeface="Arial" panose="020B0604020202020204" pitchFamily="34" charset="0"/>
+              <a:buChar char="•"/>
+            </a:pPr>
+            <a:r>
+              <a:rPr lang="en-US" i="0" dirty="0">
+                <a:latin typeface="Segoe UI" panose="020B0502040204020203" pitchFamily="34" charset="0"/>
+                <a:cs typeface="Segoe UI" panose="020B0502040204020203" pitchFamily="34" charset="0"/>
+              </a:rPr>
+              <a:t>How current is the information in the source?</a:t>
+            </a:r>
+          </a:p>
+          <a:p>
+            <a:pPr marL="171450" indent="-171450">
+              <a:buFont typeface="Arial" panose="020B0604020202020204" pitchFamily="34" charset="0"/>
+              <a:buChar char="•"/>
+            </a:pPr>
+            <a:r>
+              <a:rPr lang="en-US" i="0" dirty="0">
+                <a:latin typeface="Segoe UI" panose="020B0502040204020203" pitchFamily="34" charset="0"/>
+                <a:cs typeface="Segoe UI" panose="020B0502040204020203" pitchFamily="34" charset="0"/>
+              </a:rPr>
+              <a:t>When was the source published?</a:t>
+            </a:r>
+          </a:p>
+          <a:p>
+            <a:pPr marL="171450" indent="-171450">
+              <a:buFont typeface="Arial" panose="020B0604020202020204" pitchFamily="34" charset="0"/>
+              <a:buChar char="•"/>
+            </a:pPr>
+            <a:r>
+              <a:rPr lang="en-US" i="0" dirty="0">
+                <a:latin typeface="Segoe UI" panose="020B0502040204020203" pitchFamily="34" charset="0"/>
+                <a:cs typeface="Segoe UI" panose="020B0502040204020203" pitchFamily="34" charset="0"/>
+              </a:rPr>
+              <a:t>Is the information out-of-date?</a:t>
+            </a:r>
+          </a:p>
+          <a:p>
+            <a:pPr marL="171450" indent="-171450">
+              <a:buFont typeface="Arial" panose="020B0604020202020204" pitchFamily="34" charset="0"/>
+              <a:buChar char="•"/>
+            </a:pPr>
+            <a:endParaRPr lang="en-US" b="1" i="0" dirty="0">
+              <a:latin typeface="Segoe UI" panose="020B0502040204020203" pitchFamily="34" charset="0"/>
+              <a:cs typeface="Segoe UI" panose="020B0502040204020203" pitchFamily="34" charset="0"/>
+            </a:endParaRPr>
+          </a:p>
+          <a:p>
+            <a:pPr marL="0" indent="0">
+              <a:buFont typeface="Arial" panose="020B0604020202020204" pitchFamily="34" charset="0"/>
+              <a:buNone/>
+            </a:pPr>
+            <a:r>
+              <a:rPr lang="en-US" b="1" i="0" dirty="0">
+                <a:latin typeface="Segoe UI" panose="020B0502040204020203" pitchFamily="34" charset="0"/>
+                <a:cs typeface="Segoe UI" panose="020B0502040204020203" pitchFamily="34" charset="0"/>
+              </a:rPr>
+              <a:t>Accuracy: </a:t>
+            </a:r>
+          </a:p>
+          <a:p>
+            <a:pPr marL="171450" indent="-171450">
+              <a:buFont typeface="Arial" panose="020B0604020202020204" pitchFamily="34" charset="0"/>
+              <a:buChar char="•"/>
+            </a:pPr>
+            <a:r>
+              <a:rPr lang="en-US" i="0" dirty="0">
+                <a:latin typeface="Segoe UI" panose="020B0502040204020203" pitchFamily="34" charset="0"/>
+                <a:cs typeface="Segoe UI" panose="020B0502040204020203" pitchFamily="34" charset="0"/>
+              </a:rPr>
+              <a:t>Is the content accurate?</a:t>
+            </a:r>
+          </a:p>
+          <a:p>
+            <a:pPr marL="171450" indent="-171450">
+              <a:buFont typeface="Arial" panose="020B0604020202020204" pitchFamily="34" charset="0"/>
+              <a:buChar char="•"/>
+            </a:pPr>
+            <a:r>
+              <a:rPr lang="en-US" i="0" dirty="0">
+                <a:latin typeface="Segoe UI" panose="020B0502040204020203" pitchFamily="34" charset="0"/>
+                <a:cs typeface="Segoe UI" panose="020B0502040204020203" pitchFamily="34" charset="0"/>
+              </a:rPr>
+              <a:t>Is the information presented objectively?  Do they share the pros and cons?</a:t>
+            </a:r>
+          </a:p>
+        </p:txBody>
+      </p:sp>
+      <p:sp>
+        <p:nvSpPr>
+          <p:cNvPr id="4" name="Slide Number Placeholder 3"/>
+          <p:cNvSpPr>
+            <a:spLocks noGrp="1"/>
+          </p:cNvSpPr>
+          <p:nvPr>
+            <p:ph type="sldNum" sz="quarter" idx="10"/>
+          </p:nvPr>
+        </p:nvSpPr>
+        <p:spPr/>
+        <p:txBody>
+          <a:bodyPr/>
+          <a:lstStyle/>
+          <a:p>
+            <a:fld id="{BC849E9A-41F7-4779-A581-48A7C374A227}" type="slidenum">
+              <a:rPr lang="en-US" smtClean="0"/>
+              <a:t>20</a:t>
+            </a:fld>
+            <a:endParaRPr lang="en-US" dirty="0"/>
+          </a:p>
+        </p:txBody>
+      </p:sp>
+    </p:spTree>
+    <p:extLst>
+      <p:ext uri="{BB962C8B-B14F-4D97-AF65-F5344CB8AC3E}">
+        <p14:creationId xmlns:p14="http://schemas.microsoft.com/office/powerpoint/2010/main" val="2219405240"/>
       </p:ext>
     </p:extLst>
   </p:cSld>
@@ -14577,6 +14833,428 @@
     <p:extLst>
       <p:ext uri="{BB962C8B-B14F-4D97-AF65-F5344CB8AC3E}">
         <p14:creationId xmlns:p14="http://schemas.microsoft.com/office/powerpoint/2010/main" val="381659708"/>
+      </p:ext>
+    </p:extLst>
+  </p:cSld>
+  <p:clrMapOvr>
+    <a:masterClrMapping/>
+  </p:clrMapOvr>
+</p:sld>
+</file>
+
+<file path=ppt/slides/slide20.xml><?xml version="1.0" encoding="utf-8"?>
+<p:sld xmlns:a="http://schemas.openxmlformats.org/drawingml/2006/main" xmlns:r="http://schemas.openxmlformats.org/officeDocument/2006/relationships" xmlns:p="http://schemas.openxmlformats.org/presentationml/2006/main">
+  <p:cSld>
+    <p:bg>
+      <p:bgPr>
+        <a:solidFill>
+          <a:schemeClr val="bg1"/>
+        </a:solidFill>
+        <a:effectLst/>
+      </p:bgPr>
+    </p:bg>
+    <p:spTree>
+      <p:nvGrpSpPr>
+        <p:cNvPr id="1" name=""/>
+        <p:cNvGrpSpPr/>
+        <p:nvPr/>
+      </p:nvGrpSpPr>
+      <p:grpSpPr>
+        <a:xfrm>
+          <a:off x="0" y="0"/>
+          <a:ext cx="0" cy="0"/>
+          <a:chOff x="0" y="0"/>
+          <a:chExt cx="0" cy="0"/>
+        </a:xfrm>
+      </p:grpSpPr>
+      <p:sp useBgFill="1">
+        <p:nvSpPr>
+          <p:cNvPr id="71" name="Rectangle 70">
+            <a:extLst>
+              <a:ext uri="{FF2B5EF4-FFF2-40B4-BE49-F238E27FC236}">
+                <a16:creationId xmlns:a16="http://schemas.microsoft.com/office/drawing/2014/main" id="{C1A1C5D3-C053-4EE9-BE1A-419B6E27CCAE}"/>
+              </a:ext>
+              <a:ext uri="{C183D7F6-B498-43B3-948B-1728B52AA6E4}">
+                <adec:decorative xmlns:adec="http://schemas.microsoft.com/office/drawing/2017/decorative" val="1"/>
+              </a:ext>
+            </a:extLst>
+          </p:cNvPr>
+          <p:cNvSpPr>
+            <a:spLocks noGrp="1" noRot="1" noChangeAspect="1" noMove="1" noResize="1" noEditPoints="1" noAdjustHandles="1" noChangeArrowheads="1" noChangeShapeType="1" noTextEdit="1"/>
+          </p:cNvSpPr>
+          <p:nvPr>
+            <p:extLst>
+              <p:ext uri="{386F3935-93C4-4BCD-93E2-E3B085C9AB24}">
+                <p16:designElem xmlns:p16="http://schemas.microsoft.com/office/powerpoint/2015/main" val="1"/>
+              </p:ext>
+            </p:extLst>
+          </p:nvPr>
+        </p:nvSpPr>
+        <p:spPr>
+          <a:xfrm>
+            <a:off x="0" y="0"/>
+            <a:ext cx="12192000" cy="6858000"/>
+          </a:xfrm>
+          <a:prstGeom prst="rect">
+            <a:avLst/>
+          </a:prstGeom>
+          <a:ln>
+            <a:noFill/>
+          </a:ln>
+        </p:spPr>
+        <p:style>
+          <a:lnRef idx="2">
+            <a:schemeClr val="accent1">
+              <a:shade val="50000"/>
+            </a:schemeClr>
+          </a:lnRef>
+          <a:fillRef idx="1">
+            <a:schemeClr val="accent1"/>
+          </a:fillRef>
+          <a:effectRef idx="0">
+            <a:schemeClr val="accent1"/>
+          </a:effectRef>
+          <a:fontRef idx="minor">
+            <a:schemeClr val="lt1"/>
+          </a:fontRef>
+        </p:style>
+        <p:txBody>
+          <a:bodyPr rtlCol="0" anchor="ctr"/>
+          <a:lstStyle/>
+          <a:p>
+            <a:pPr algn="ctr"/>
+            <a:endParaRPr lang="en-US" dirty="0"/>
+          </a:p>
+        </p:txBody>
+      </p:sp>
+      <p:sp useBgFill="1">
+        <p:nvSpPr>
+          <p:cNvPr id="73" name="Rectangle 72">
+            <a:extLst>
+              <a:ext uri="{FF2B5EF4-FFF2-40B4-BE49-F238E27FC236}">
+                <a16:creationId xmlns:a16="http://schemas.microsoft.com/office/drawing/2014/main" id="{A3473CF9-37EB-43E7-89EF-D2D1C53D1DAC}"/>
+              </a:ext>
+              <a:ext uri="{C183D7F6-B498-43B3-948B-1728B52AA6E4}">
+                <adec:decorative xmlns:adec="http://schemas.microsoft.com/office/drawing/2017/decorative" val="1"/>
+              </a:ext>
+            </a:extLst>
+          </p:cNvPr>
+          <p:cNvSpPr>
+            <a:spLocks noGrp="1" noRot="1" noChangeAspect="1" noMove="1" noResize="1" noEditPoints="1" noAdjustHandles="1" noChangeArrowheads="1" noChangeShapeType="1" noTextEdit="1"/>
+          </p:cNvSpPr>
+          <p:nvPr>
+            <p:extLst>
+              <p:ext uri="{386F3935-93C4-4BCD-93E2-E3B085C9AB24}">
+                <p16:designElem xmlns:p16="http://schemas.microsoft.com/office/powerpoint/2015/main" val="1"/>
+              </p:ext>
+            </p:extLst>
+          </p:nvPr>
+        </p:nvSpPr>
+        <p:spPr>
+          <a:xfrm>
+            <a:off x="1903615" y="221673"/>
+            <a:ext cx="8384770" cy="1332634"/>
+          </a:xfrm>
+          <a:prstGeom prst="rect">
+            <a:avLst/>
+          </a:prstGeom>
+          <a:ln w="12700">
+            <a:solidFill>
+              <a:srgbClr val="E1E1E1"/>
+            </a:solidFill>
+          </a:ln>
+          <a:effectLst>
+            <a:outerShdw blurRad="50800" dist="38100" dir="2700000" algn="tl" rotWithShape="0">
+              <a:schemeClr val="bg2">
+                <a:lumMod val="85000"/>
+                <a:alpha val="50000"/>
+              </a:schemeClr>
+            </a:outerShdw>
+          </a:effectLst>
+        </p:spPr>
+        <p:style>
+          <a:lnRef idx="2">
+            <a:schemeClr val="accent1">
+              <a:shade val="50000"/>
+            </a:schemeClr>
+          </a:lnRef>
+          <a:fillRef idx="1">
+            <a:schemeClr val="accent1"/>
+          </a:fillRef>
+          <a:effectRef idx="0">
+            <a:schemeClr val="accent1"/>
+          </a:effectRef>
+          <a:fontRef idx="minor">
+            <a:schemeClr val="lt1"/>
+          </a:fontRef>
+        </p:style>
+        <p:txBody>
+          <a:bodyPr rtlCol="0" anchor="ctr"/>
+          <a:lstStyle/>
+          <a:p>
+            <a:pPr marL="0" marR="0" lvl="0" indent="0" algn="ctr" defTabSz="914400" rtl="0" eaLnBrk="1" fontAlgn="auto" latinLnBrk="0" hangingPunct="1">
+              <a:lnSpc>
+                <a:spcPct val="100000"/>
+              </a:lnSpc>
+              <a:spcBef>
+                <a:spcPts val="0"/>
+              </a:spcBef>
+              <a:spcAft>
+                <a:spcPts val="0"/>
+              </a:spcAft>
+              <a:buClrTx/>
+              <a:buSzTx/>
+              <a:buFontTx/>
+              <a:buNone/>
+              <a:tabLst/>
+              <a:defRPr/>
+            </a:pPr>
+            <a:endParaRPr kumimoji="0" lang="en-US" sz="1800" b="0" i="0" u="none" strike="noStrike" kern="1200" cap="none" spc="0" normalizeH="0" baseline="0" noProof="0" dirty="0">
+              <a:ln>
+                <a:noFill/>
+              </a:ln>
+              <a:solidFill>
+                <a:prstClr val="white"/>
+              </a:solidFill>
+              <a:effectLst/>
+              <a:uLnTx/>
+              <a:uFillTx/>
+              <a:latin typeface="Calibri" panose="020F0502020204030204"/>
+              <a:ea typeface="+mn-ea"/>
+              <a:cs typeface="+mn-cs"/>
+            </a:endParaRPr>
+          </a:p>
+        </p:txBody>
+      </p:sp>
+      <p:sp>
+        <p:nvSpPr>
+          <p:cNvPr id="2" name="Title 1">
+            <a:extLst>
+              <a:ext uri="{FF2B5EF4-FFF2-40B4-BE49-F238E27FC236}">
+                <a16:creationId xmlns:a16="http://schemas.microsoft.com/office/drawing/2014/main" id="{0FDE5079-B185-4DE0-AF2C-AE4B7709FBC3}"/>
+              </a:ext>
+            </a:extLst>
+          </p:cNvPr>
+          <p:cNvSpPr>
+            <a:spLocks noGrp="1"/>
+          </p:cNvSpPr>
+          <p:nvPr>
+            <p:ph type="title"/>
+          </p:nvPr>
+        </p:nvSpPr>
+        <p:spPr>
+          <a:xfrm>
+            <a:off x="2103121" y="310343"/>
+            <a:ext cx="7985759" cy="868823"/>
+          </a:xfrm>
+        </p:spPr>
+        <p:txBody>
+          <a:bodyPr vert="horz" lIns="91440" tIns="45720" rIns="91440" bIns="45720" rtlCol="0" anchor="ctr">
+            <a:normAutofit/>
+          </a:bodyPr>
+          <a:lstStyle/>
+          <a:p>
+            <a:pPr algn="ctr"/>
+            <a:r>
+              <a:rPr lang="en-US" sz="4000" dirty="0"/>
+              <a:t>Change/Release Management</a:t>
+            </a:r>
+            <a:endParaRPr lang="en-US" sz="4000" kern="1200" dirty="0">
+              <a:solidFill>
+                <a:schemeClr val="tx1"/>
+              </a:solidFill>
+              <a:latin typeface="+mj-lt"/>
+              <a:ea typeface="+mj-ea"/>
+              <a:cs typeface="+mj-cs"/>
+            </a:endParaRPr>
+          </a:p>
+        </p:txBody>
+      </p:sp>
+      <p:sp>
+        <p:nvSpPr>
+          <p:cNvPr id="75" name="Rectangle: Rounded Corners 74">
+            <a:extLst>
+              <a:ext uri="{FF2B5EF4-FFF2-40B4-BE49-F238E27FC236}">
+                <a16:creationId xmlns:a16="http://schemas.microsoft.com/office/drawing/2014/main" id="{586B4EF9-43BA-4655-A6FF-1D8E21574C95}"/>
+              </a:ext>
+              <a:ext uri="{C183D7F6-B498-43B3-948B-1728B52AA6E4}">
+                <adec:decorative xmlns:adec="http://schemas.microsoft.com/office/drawing/2017/decorative" val="1"/>
+              </a:ext>
+            </a:extLst>
+          </p:cNvPr>
+          <p:cNvSpPr>
+            <a:spLocks noGrp="1" noRot="1" noChangeAspect="1" noMove="1" noResize="1" noEditPoints="1" noAdjustHandles="1" noChangeArrowheads="1" noChangeShapeType="1" noTextEdit="1"/>
+          </p:cNvSpPr>
+          <p:nvPr>
+            <p:extLst>
+              <p:ext uri="{386F3935-93C4-4BCD-93E2-E3B085C9AB24}">
+                <p16:designElem xmlns:p16="http://schemas.microsoft.com/office/powerpoint/2015/main" val="1"/>
+              </p:ext>
+            </p:extLst>
+          </p:nvPr>
+        </p:nvSpPr>
+        <p:spPr>
+          <a:xfrm>
+            <a:off x="2483110" y="1211407"/>
+            <a:ext cx="7225780" cy="685800"/>
+          </a:xfrm>
+          <a:prstGeom prst="roundRect">
+            <a:avLst>
+              <a:gd name="adj" fmla="val 0"/>
+            </a:avLst>
+          </a:prstGeom>
+          <a:solidFill>
+            <a:schemeClr val="accent2"/>
+          </a:solidFill>
+          <a:ln>
+            <a:noFill/>
+          </a:ln>
+        </p:spPr>
+        <p:style>
+          <a:lnRef idx="2">
+            <a:schemeClr val="accent1">
+              <a:shade val="50000"/>
+            </a:schemeClr>
+          </a:lnRef>
+          <a:fillRef idx="1">
+            <a:schemeClr val="accent1"/>
+          </a:fillRef>
+          <a:effectRef idx="0">
+            <a:schemeClr val="accent1"/>
+          </a:effectRef>
+          <a:fontRef idx="minor">
+            <a:schemeClr val="lt1"/>
+          </a:fontRef>
+        </p:style>
+        <p:txBody>
+          <a:bodyPr rtlCol="0" anchor="ctr"/>
+          <a:lstStyle/>
+          <a:p>
+            <a:pPr algn="ctr"/>
+            <a:endParaRPr lang="en-US" dirty="0">
+              <a:solidFill>
+                <a:prstClr val="white"/>
+              </a:solidFill>
+              <a:latin typeface="Calibri" panose="020F0502020204030204"/>
+            </a:endParaRPr>
+          </a:p>
+        </p:txBody>
+      </p:sp>
+      <p:sp>
+        <p:nvSpPr>
+          <p:cNvPr id="3" name="TextBox 2">
+            <a:extLst>
+              <a:ext uri="{FF2B5EF4-FFF2-40B4-BE49-F238E27FC236}">
+                <a16:creationId xmlns:a16="http://schemas.microsoft.com/office/drawing/2014/main" id="{1C4BF56A-ED85-42EF-9C2C-2C84F4C11132}"/>
+              </a:ext>
+            </a:extLst>
+          </p:cNvPr>
+          <p:cNvSpPr txBox="1"/>
+          <p:nvPr/>
+        </p:nvSpPr>
+        <p:spPr>
+          <a:xfrm>
+            <a:off x="1173017" y="2290618"/>
+            <a:ext cx="10058400" cy="3693319"/>
+          </a:xfrm>
+          <a:prstGeom prst="rect">
+            <a:avLst/>
+          </a:prstGeom>
+          <a:noFill/>
+        </p:spPr>
+        <p:txBody>
+          <a:bodyPr wrap="square" rtlCol="0">
+            <a:spAutoFit/>
+          </a:bodyPr>
+          <a:lstStyle/>
+          <a:p>
+            <a:r>
+              <a:rPr lang="en-US" dirty="0"/>
+              <a:t>All changes will be prioritized, scheduled, and deployed accordingly.</a:t>
+            </a:r>
+          </a:p>
+          <a:p>
+            <a:endParaRPr lang="en-US" dirty="0"/>
+          </a:p>
+          <a:p>
+            <a:r>
+              <a:rPr lang="en-US" dirty="0"/>
+              <a:t>Production deployments will occur monthly</a:t>
+            </a:r>
+          </a:p>
+          <a:p>
+            <a:endParaRPr lang="en-US" dirty="0"/>
+          </a:p>
+          <a:p>
+            <a:r>
+              <a:rPr lang="en-US" dirty="0"/>
+              <a:t>Break fix deployments will occur bi-monthly (every other week)</a:t>
+            </a:r>
+          </a:p>
+          <a:p>
+            <a:endParaRPr lang="en-US" dirty="0"/>
+          </a:p>
+          <a:p>
+            <a:r>
+              <a:rPr lang="en-US" dirty="0"/>
+              <a:t>Emergency break fix deployments will occur on an ad-hoc basis</a:t>
+            </a:r>
+          </a:p>
+          <a:p>
+            <a:endParaRPr lang="en-US" dirty="0"/>
+          </a:p>
+          <a:p>
+            <a:r>
+              <a:rPr lang="en-US" dirty="0"/>
+              <a:t>Production deployments will be approved via CAB, with the following considerations:</a:t>
+            </a:r>
+          </a:p>
+          <a:p>
+            <a:pPr marL="742950" lvl="1" indent="-285750">
+              <a:buFont typeface="Arial" panose="020B0604020202020204" pitchFamily="34" charset="0"/>
+              <a:buChar char="•"/>
+            </a:pPr>
+            <a:r>
+              <a:rPr lang="en-US" dirty="0"/>
+              <a:t>All deployments must follow audit guidelines (including deployment change ticket)</a:t>
+            </a:r>
+          </a:p>
+          <a:p>
+            <a:pPr marL="742950" lvl="1" indent="-285750">
+              <a:buFont typeface="Arial" panose="020B0604020202020204" pitchFamily="34" charset="0"/>
+              <a:buChar char="•"/>
+            </a:pPr>
+            <a:r>
+              <a:rPr lang="en-US" dirty="0"/>
+              <a:t>All changes must be tested in the non-production environments</a:t>
+            </a:r>
+          </a:p>
+          <a:p>
+            <a:pPr marL="742950" lvl="1" indent="-285750">
+              <a:buFont typeface="Arial" panose="020B0604020202020204" pitchFamily="34" charset="0"/>
+              <a:buChar char="•"/>
+            </a:pPr>
+            <a:r>
+              <a:rPr lang="en-US" dirty="0"/>
+              <a:t>All changes must be presented in a demo</a:t>
+            </a:r>
+          </a:p>
+          <a:p>
+            <a:pPr marL="742950" lvl="1" indent="-285750">
+              <a:buFont typeface="Arial" panose="020B0604020202020204" pitchFamily="34" charset="0"/>
+              <a:buChar char="•"/>
+            </a:pPr>
+            <a:r>
+              <a:rPr lang="en-US" dirty="0"/>
+              <a:t>Must have business/customer approval</a:t>
+            </a:r>
+          </a:p>
+        </p:txBody>
+      </p:sp>
+    </p:spTree>
+    <p:extLst>
+      <p:ext uri="{BB962C8B-B14F-4D97-AF65-F5344CB8AC3E}">
+        <p14:creationId xmlns:p14="http://schemas.microsoft.com/office/powerpoint/2010/main" val="823015087"/>
       </p:ext>
     </p:extLst>
   </p:cSld>
@@ -18253,20 +18931,20 @@
 </file>
 
 <file path=customXml/item1.xml><?xml version="1.0" encoding="utf-8"?>
+<p:properties xmlns:p="http://schemas.microsoft.com/office/2006/metadata/properties" xmlns:xsi="http://www.w3.org/2001/XMLSchema-instance" xmlns:pc="http://schemas.microsoft.com/office/infopath/2007/PartnerControls">
+  <documentManagement>
+    <MediaServiceKeyPoints xmlns="71af3243-3dd4-4a8d-8c0d-dd76da1f02a5" xsi:nil="true"/>
+  </documentManagement>
+</p:properties>
+</file>
+
+<file path=customXml/item2.xml><?xml version="1.0" encoding="utf-8"?>
 <?mso-contentType ?>
 <FormTemplates xmlns="http://schemas.microsoft.com/sharepoint/v3/contenttype/forms">
   <Display>DocumentLibraryForm</Display>
   <Edit>DocumentLibraryForm</Edit>
   <New>DocumentLibraryForm</New>
 </FormTemplates>
-</file>
-
-<file path=customXml/item2.xml><?xml version="1.0" encoding="utf-8"?>
-<p:properties xmlns:p="http://schemas.microsoft.com/office/2006/metadata/properties" xmlns:xsi="http://www.w3.org/2001/XMLSchema-instance" xmlns:pc="http://schemas.microsoft.com/office/infopath/2007/PartnerControls">
-  <documentManagement>
-    <MediaServiceKeyPoints xmlns="71af3243-3dd4-4a8d-8c0d-dd76da1f02a5" xsi:nil="true"/>
-  </documentManagement>
-</p:properties>
 </file>
 
 <file path=customXml/item3.xml><?xml version="1.0" encoding="utf-8"?>
@@ -18481,14 +19159,6 @@
 </file>
 
 <file path=customXml/itemProps1.xml><?xml version="1.0" encoding="utf-8"?>
-<ds:datastoreItem xmlns:ds="http://schemas.openxmlformats.org/officeDocument/2006/customXml" ds:itemID="{5CA875DA-F9FD-4F83-A049-3B1027B542DE}">
-  <ds:schemaRefs>
-    <ds:schemaRef ds:uri="http://schemas.microsoft.com/sharepoint/v3/contenttype/forms"/>
-  </ds:schemaRefs>
-</ds:datastoreItem>
-</file>
-
-<file path=customXml/itemProps2.xml><?xml version="1.0" encoding="utf-8"?>
 <ds:datastoreItem xmlns:ds="http://schemas.openxmlformats.org/officeDocument/2006/customXml" ds:itemID="{03C7D9E6-B0D9-433E-BD46-EB60F64F4DA8}">
   <ds:schemaRefs>
     <ds:schemaRef ds:uri="http://purl.org/dc/elements/1.1/"/>
@@ -18501,6 +19171,14 @@
     <ds:schemaRef ds:uri="http://schemas.microsoft.com/office/infopath/2007/PartnerControls"/>
     <ds:schemaRef ds:uri="71af3243-3dd4-4a8d-8c0d-dd76da1f02a5"/>
     <ds:schemaRef ds:uri="http://www.w3.org/XML/1998/namespace"/>
+  </ds:schemaRefs>
+</ds:datastoreItem>
+</file>
+
+<file path=customXml/itemProps2.xml><?xml version="1.0" encoding="utf-8"?>
+<ds:datastoreItem xmlns:ds="http://schemas.openxmlformats.org/officeDocument/2006/customXml" ds:itemID="{5CA875DA-F9FD-4F83-A049-3B1027B542DE}">
+  <ds:schemaRefs>
+    <ds:schemaRef ds:uri="http://schemas.microsoft.com/sharepoint/v3/contenttype/forms"/>
   </ds:schemaRefs>
 </ds:datastoreItem>
 </file>

</xml_diff>